<commit_message>
Added affected datasets demo .pptx, demo pics
</commit_message>
<xml_diff>
--- a/docs/Affected_Datasets_Demo.pptx
+++ b/docs/Affected_Datasets_Demo.pptx
@@ -7,18 +7,21 @@
   <p:sldIdLst>
     <p:sldId id="256" r:id="rId2"/>
     <p:sldId id="257" r:id="rId3"/>
-    <p:sldId id="263" r:id="rId4"/>
-    <p:sldId id="260" r:id="rId5"/>
-    <p:sldId id="259" r:id="rId6"/>
-    <p:sldId id="265" r:id="rId7"/>
-    <p:sldId id="266" r:id="rId8"/>
-    <p:sldId id="258" r:id="rId9"/>
-    <p:sldId id="262" r:id="rId10"/>
-    <p:sldId id="264" r:id="rId11"/>
-    <p:sldId id="261" r:id="rId12"/>
-    <p:sldId id="267" r:id="rId13"/>
-    <p:sldId id="268" r:id="rId14"/>
-    <p:sldId id="269" r:id="rId15"/>
+    <p:sldId id="271" r:id="rId4"/>
+    <p:sldId id="263" r:id="rId5"/>
+    <p:sldId id="260" r:id="rId6"/>
+    <p:sldId id="259" r:id="rId7"/>
+    <p:sldId id="265" r:id="rId8"/>
+    <p:sldId id="266" r:id="rId9"/>
+    <p:sldId id="272" r:id="rId10"/>
+    <p:sldId id="258" r:id="rId11"/>
+    <p:sldId id="262" r:id="rId12"/>
+    <p:sldId id="270" r:id="rId13"/>
+    <p:sldId id="264" r:id="rId14"/>
+    <p:sldId id="267" r:id="rId15"/>
+    <p:sldId id="268" r:id="rId16"/>
+    <p:sldId id="269" r:id="rId17"/>
+    <p:sldId id="261" r:id="rId18"/>
   </p:sldIdLst>
   <p:sldSz cx="9144000" cy="6858000" type="screen4x3"/>
   <p:notesSz cx="6858000" cy="9144000"/>
@@ -3225,6 +3228,367 @@
           <a:chExt cx="0" cy="0"/>
         </a:xfrm>
       </p:grpSpPr>
+      <p:sp>
+        <p:nvSpPr>
+          <p:cNvPr id="2" name="Title 1"/>
+          <p:cNvSpPr>
+            <a:spLocks noGrp="1"/>
+          </p:cNvSpPr>
+          <p:nvPr>
+            <p:ph type="title"/>
+          </p:nvPr>
+        </p:nvSpPr>
+        <p:spPr/>
+        <p:txBody>
+          <a:bodyPr>
+            <a:normAutofit/>
+          </a:bodyPr>
+          <a:lstStyle/>
+          <a:p>
+            <a:r>
+              <a:rPr lang="en-US" dirty="0" smtClean="0"/>
+              <a:t>Affected Datasets System</a:t>
+            </a:r>
+            <a:endParaRPr lang="en-US" dirty="0"/>
+          </a:p>
+        </p:txBody>
+      </p:sp>
+      <p:sp>
+        <p:nvSpPr>
+          <p:cNvPr id="3" name="Content Placeholder 2"/>
+          <p:cNvSpPr>
+            <a:spLocks noGrp="1"/>
+          </p:cNvSpPr>
+          <p:nvPr>
+            <p:ph idx="1"/>
+          </p:nvPr>
+        </p:nvSpPr>
+        <p:spPr>
+          <a:xfrm>
+            <a:off x="551271" y="1951870"/>
+            <a:ext cx="8229600" cy="4174293"/>
+          </a:xfrm>
+        </p:spPr>
+        <p:txBody>
+          <a:bodyPr>
+            <a:normAutofit/>
+          </a:bodyPr>
+          <a:lstStyle/>
+          <a:p>
+            <a:pPr marL="0" indent="0">
+              <a:buNone/>
+            </a:pPr>
+            <a:endParaRPr lang="en-US" dirty="0" smtClean="0"/>
+          </a:p>
+          <a:p>
+            <a:pPr lvl="1"/>
+            <a:r>
+              <a:rPr lang="en-US" dirty="0" smtClean="0"/>
+              <a:t>Automatically runs </a:t>
+            </a:r>
+            <a:r>
+              <a:rPr lang="en-US" dirty="0" err="1" smtClean="0"/>
+              <a:t>crds.bestrefs</a:t>
+            </a:r>
+            <a:r>
+              <a:rPr lang="en-US" dirty="0" smtClean="0"/>
+              <a:t> basic tool</a:t>
+            </a:r>
+          </a:p>
+          <a:p>
+            <a:pPr lvl="1"/>
+            <a:r>
+              <a:rPr lang="en-US" dirty="0" smtClean="0"/>
+              <a:t>Permanently Stores Results</a:t>
+            </a:r>
+          </a:p>
+          <a:p>
+            <a:pPr lvl="1"/>
+            <a:r>
+              <a:rPr lang="en-US" dirty="0" smtClean="0"/>
+              <a:t>Client/Server interface for fetching results</a:t>
+            </a:r>
+          </a:p>
+          <a:p>
+            <a:pPr lvl="1"/>
+            <a:r>
+              <a:rPr lang="en-US" dirty="0" smtClean="0"/>
+              <a:t>E-mails </a:t>
+            </a:r>
+            <a:r>
+              <a:rPr lang="en-US" dirty="0" smtClean="0"/>
+              <a:t>results</a:t>
+            </a:r>
+            <a:endParaRPr lang="en-US" dirty="0" smtClean="0"/>
+          </a:p>
+          <a:p>
+            <a:pPr lvl="1"/>
+            <a:endParaRPr lang="en-US" dirty="0" smtClean="0"/>
+          </a:p>
+          <a:p>
+            <a:endParaRPr lang="en-US" dirty="0"/>
+          </a:p>
+        </p:txBody>
+      </p:sp>
+    </p:spTree>
+    <p:extLst>
+      <p:ext uri="{BB962C8B-B14F-4D97-AF65-F5344CB8AC3E}">
+        <p14:creationId xmlns:p14="http://schemas.microsoft.com/office/powerpoint/2010/main" val="2363340426"/>
+      </p:ext>
+    </p:extLst>
+  </p:cSld>
+  <p:clrMapOvr>
+    <a:masterClrMapping/>
+  </p:clrMapOvr>
+  <p:timing>
+    <p:tnLst>
+      <p:par>
+        <p:cTn xmlns:p14="http://schemas.microsoft.com/office/powerpoint/2010/main" id="1" dur="indefinite" restart="never" nodeType="tmRoot"/>
+      </p:par>
+    </p:tnLst>
+  </p:timing>
+</p:sld>
+</file>
+
+<file path=ppt/slides/slide11.xml><?xml version="1.0" encoding="utf-8"?>
+<p:sld xmlns:a="http://schemas.openxmlformats.org/drawingml/2006/main" xmlns:r="http://schemas.openxmlformats.org/officeDocument/2006/relationships" xmlns:p="http://schemas.openxmlformats.org/presentationml/2006/main">
+  <p:cSld>
+    <p:spTree>
+      <p:nvGrpSpPr>
+        <p:cNvPr id="1" name=""/>
+        <p:cNvGrpSpPr/>
+        <p:nvPr/>
+      </p:nvGrpSpPr>
+      <p:grpSpPr>
+        <a:xfrm>
+          <a:off x="0" y="0"/>
+          <a:ext cx="0" cy="0"/>
+          <a:chOff x="0" y="0"/>
+          <a:chExt cx="0" cy="0"/>
+        </a:xfrm>
+      </p:grpSpPr>
+      <p:pic>
+        <p:nvPicPr>
+          <p:cNvPr id="5" name="Picture 4" descr="monitor_reprocessing.png"/>
+          <p:cNvPicPr>
+            <a:picLocks noChangeAspect="1"/>
+          </p:cNvPicPr>
+          <p:nvPr/>
+        </p:nvPicPr>
+        <p:blipFill>
+          <a:blip r:embed="rId2">
+            <a:extLst>
+              <a:ext uri="{28A0092B-C50C-407E-A947-70E740481C1C}">
+                <a14:useLocalDpi xmlns:a14="http://schemas.microsoft.com/office/drawing/2010/main" val="0"/>
+              </a:ext>
+            </a:extLst>
+          </a:blip>
+          <a:stretch>
+            <a:fillRect/>
+          </a:stretch>
+        </p:blipFill>
+        <p:spPr>
+          <a:xfrm>
+            <a:off x="0" y="1371600"/>
+            <a:ext cx="9144000" cy="4097891"/>
+          </a:xfrm>
+          <a:prstGeom prst="rect">
+            <a:avLst/>
+          </a:prstGeom>
+        </p:spPr>
+      </p:pic>
+    </p:spTree>
+    <p:extLst>
+      <p:ext uri="{BB962C8B-B14F-4D97-AF65-F5344CB8AC3E}">
+        <p14:creationId xmlns:p14="http://schemas.microsoft.com/office/powerpoint/2010/main" val="3448052673"/>
+      </p:ext>
+    </p:extLst>
+  </p:cSld>
+  <p:clrMapOvr>
+    <a:masterClrMapping/>
+  </p:clrMapOvr>
+  <p:timing>
+    <p:tnLst>
+      <p:par>
+        <p:cTn xmlns:p14="http://schemas.microsoft.com/office/powerpoint/2010/main" id="1" dur="indefinite" restart="never" nodeType="tmRoot"/>
+      </p:par>
+    </p:tnLst>
+  </p:timing>
+</p:sld>
+</file>
+
+<file path=ppt/slides/slide12.xml><?xml version="1.0" encoding="utf-8"?>
+<p:sld xmlns:a="http://schemas.openxmlformats.org/drawingml/2006/main" xmlns:r="http://schemas.openxmlformats.org/officeDocument/2006/relationships" xmlns:p="http://schemas.openxmlformats.org/presentationml/2006/main">
+  <p:cSld>
+    <p:spTree>
+      <p:nvGrpSpPr>
+        <p:cNvPr id="1" name=""/>
+        <p:cNvGrpSpPr/>
+        <p:nvPr/>
+      </p:nvGrpSpPr>
+      <p:grpSpPr>
+        <a:xfrm>
+          <a:off x="0" y="0"/>
+          <a:ext cx="0" cy="0"/>
+          <a:chOff x="0" y="0"/>
+          <a:chExt cx="0" cy="0"/>
+        </a:xfrm>
+      </p:grpSpPr>
+      <p:sp>
+        <p:nvSpPr>
+          <p:cNvPr id="2" name="Title 1"/>
+          <p:cNvSpPr>
+            <a:spLocks noGrp="1"/>
+          </p:cNvSpPr>
+          <p:nvPr>
+            <p:ph type="title"/>
+          </p:nvPr>
+        </p:nvSpPr>
+        <p:spPr/>
+        <p:txBody>
+          <a:bodyPr/>
+          <a:lstStyle/>
+          <a:p>
+            <a:r>
+              <a:rPr lang="en-US" dirty="0" smtClean="0"/>
+              <a:t>Affected Datasets Work Flow</a:t>
+            </a:r>
+            <a:endParaRPr lang="en-US" dirty="0"/>
+          </a:p>
+        </p:txBody>
+      </p:sp>
+      <p:sp>
+        <p:nvSpPr>
+          <p:cNvPr id="3" name="Content Placeholder 2"/>
+          <p:cNvSpPr>
+            <a:spLocks noGrp="1"/>
+          </p:cNvSpPr>
+          <p:nvPr>
+            <p:ph idx="1"/>
+          </p:nvPr>
+        </p:nvSpPr>
+        <p:spPr/>
+        <p:txBody>
+          <a:bodyPr>
+            <a:normAutofit fontScale="70000" lnSpcReduction="20000"/>
+          </a:bodyPr>
+          <a:lstStyle/>
+          <a:p>
+            <a:r>
+              <a:rPr lang="en-US" dirty="0" smtClean="0"/>
+              <a:t>New References are Submitted</a:t>
+            </a:r>
+          </a:p>
+          <a:p>
+            <a:r>
+              <a:rPr lang="en-US" dirty="0" smtClean="0"/>
+              <a:t>CRDS Pipeline runs to archive files</a:t>
+            </a:r>
+          </a:p>
+          <a:p>
+            <a:r>
+              <a:rPr lang="en-US" dirty="0" smtClean="0"/>
+              <a:t>Operator does Set Context on CRDS website</a:t>
+            </a:r>
+          </a:p>
+          <a:p>
+            <a:r>
+              <a:rPr lang="en-US" dirty="0" smtClean="0"/>
+              <a:t>Operator syncs pipeline cache with new references + default</a:t>
+            </a:r>
+          </a:p>
+          <a:p>
+            <a:r>
+              <a:rPr lang="en-US" dirty="0" smtClean="0"/>
+              <a:t>CRDS server runs CRDS </a:t>
+            </a:r>
+            <a:r>
+              <a:rPr lang="en-US" dirty="0" err="1" smtClean="0"/>
+              <a:t>bestrefs</a:t>
+            </a:r>
+            <a:r>
+              <a:rPr lang="en-US" dirty="0" smtClean="0"/>
+              <a:t> </a:t>
+            </a:r>
+          </a:p>
+          <a:p>
+            <a:pPr lvl="1"/>
+            <a:r>
+              <a:rPr lang="en-US" dirty="0" smtClean="0"/>
+              <a:t>outputs permanently stored on server</a:t>
+            </a:r>
+          </a:p>
+          <a:p>
+            <a:pPr lvl="1"/>
+            <a:r>
+              <a:rPr lang="en-US" dirty="0" smtClean="0"/>
+              <a:t>e-mail issued</a:t>
+            </a:r>
+          </a:p>
+          <a:p>
+            <a:r>
+              <a:rPr lang="en-US" dirty="0" smtClean="0"/>
+              <a:t>Pipeline side query script polls server</a:t>
+            </a:r>
+          </a:p>
+          <a:p>
+            <a:pPr lvl="1"/>
+            <a:r>
+              <a:rPr lang="en-US" dirty="0" smtClean="0"/>
+              <a:t>new context transitions</a:t>
+            </a:r>
+          </a:p>
+          <a:p>
+            <a:pPr lvl="1"/>
+            <a:r>
+              <a:rPr lang="en-US" dirty="0" smtClean="0"/>
+              <a:t>affected dataset ids</a:t>
+            </a:r>
+          </a:p>
+          <a:p>
+            <a:r>
+              <a:rPr lang="en-US" dirty="0" smtClean="0"/>
+              <a:t>Reprocessing operator approves ID list</a:t>
+            </a:r>
+          </a:p>
+          <a:p>
+            <a:r>
+              <a:rPr lang="en-US" dirty="0" smtClean="0"/>
+              <a:t>Affected datasets are reprocessed by SDP</a:t>
+            </a:r>
+          </a:p>
+        </p:txBody>
+      </p:sp>
+    </p:spTree>
+    <p:extLst>
+      <p:ext uri="{BB962C8B-B14F-4D97-AF65-F5344CB8AC3E}">
+        <p14:creationId xmlns:p14="http://schemas.microsoft.com/office/powerpoint/2010/main" val="1719019723"/>
+      </p:ext>
+    </p:extLst>
+  </p:cSld>
+  <p:clrMapOvr>
+    <a:masterClrMapping/>
+  </p:clrMapOvr>
+</p:sld>
+</file>
+
+<file path=ppt/slides/slide13.xml><?xml version="1.0" encoding="utf-8"?>
+<p:sld xmlns:a="http://schemas.openxmlformats.org/drawingml/2006/main" xmlns:r="http://schemas.openxmlformats.org/officeDocument/2006/relationships" xmlns:p="http://schemas.openxmlformats.org/presentationml/2006/main">
+  <p:cSld>
+    <p:spTree>
+      <p:nvGrpSpPr>
+        <p:cNvPr id="1" name=""/>
+        <p:cNvGrpSpPr/>
+        <p:nvPr/>
+      </p:nvGrpSpPr>
+      <p:grpSpPr>
+        <a:xfrm>
+          <a:off x="0" y="0"/>
+          <a:ext cx="0" cy="0"/>
+          <a:chOff x="0" y="0"/>
+          <a:chExt cx="0" cy="0"/>
+        </a:xfrm>
+      </p:grpSpPr>
       <p:pic>
         <p:nvPicPr>
           <p:cNvPr id="4" name="Picture 3" descr="affected_datasets_workflow.png"/>
@@ -3275,7 +3639,650 @@
 </p:sld>
 </file>
 
-<file path=ppt/slides/slide11.xml><?xml version="1.0" encoding="utf-8"?>
+<file path=ppt/slides/slide14.xml><?xml version="1.0" encoding="utf-8"?>
+<p:sld xmlns:a="http://schemas.openxmlformats.org/drawingml/2006/main" xmlns:r="http://schemas.openxmlformats.org/officeDocument/2006/relationships" xmlns:p="http://schemas.openxmlformats.org/presentationml/2006/main">
+  <p:cSld>
+    <p:spTree>
+      <p:nvGrpSpPr>
+        <p:cNvPr id="1" name=""/>
+        <p:cNvGrpSpPr/>
+        <p:nvPr/>
+      </p:nvGrpSpPr>
+      <p:grpSpPr>
+        <a:xfrm>
+          <a:off x="0" y="0"/>
+          <a:ext cx="0" cy="0"/>
+          <a:chOff x="0" y="0"/>
+          <a:chExt cx="0" cy="0"/>
+        </a:xfrm>
+      </p:grpSpPr>
+      <p:sp>
+        <p:nvSpPr>
+          <p:cNvPr id="2" name="Title 1"/>
+          <p:cNvSpPr>
+            <a:spLocks noGrp="1"/>
+          </p:cNvSpPr>
+          <p:nvPr>
+            <p:ph type="title"/>
+          </p:nvPr>
+        </p:nvSpPr>
+        <p:spPr>
+          <a:xfrm>
+            <a:off x="457200" y="274638"/>
+            <a:ext cx="8229600" cy="743693"/>
+          </a:xfrm>
+        </p:spPr>
+        <p:txBody>
+          <a:bodyPr>
+            <a:normAutofit fontScale="90000"/>
+          </a:bodyPr>
+          <a:lstStyle/>
+          <a:p>
+            <a:r>
+              <a:rPr lang="en-US" dirty="0" err="1" smtClean="0"/>
+              <a:t>query_affected_datasets</a:t>
+            </a:r>
+            <a:endParaRPr lang="en-US" dirty="0"/>
+          </a:p>
+        </p:txBody>
+      </p:sp>
+      <p:sp>
+        <p:nvSpPr>
+          <p:cNvPr id="3" name="Content Placeholder 2"/>
+          <p:cNvSpPr>
+            <a:spLocks noGrp="1"/>
+          </p:cNvSpPr>
+          <p:nvPr>
+            <p:ph idx="1"/>
+          </p:nvPr>
+        </p:nvSpPr>
+        <p:spPr>
+          <a:xfrm>
+            <a:off x="457200" y="1461228"/>
+            <a:ext cx="8229600" cy="4525963"/>
+          </a:xfrm>
+        </p:spPr>
+        <p:txBody>
+          <a:bodyPr>
+            <a:normAutofit fontScale="85000" lnSpcReduction="20000"/>
+          </a:bodyPr>
+          <a:lstStyle/>
+          <a:p>
+            <a:r>
+              <a:rPr lang="en-US" dirty="0" smtClean="0"/>
+              <a:t>CRDS Client Script / </a:t>
+            </a:r>
+            <a:r>
+              <a:rPr lang="en-US" dirty="0" err="1" smtClean="0"/>
+              <a:t>Poller</a:t>
+            </a:r>
+            <a:endParaRPr lang="en-US" dirty="0" smtClean="0"/>
+          </a:p>
+          <a:p>
+            <a:r>
+              <a:rPr lang="en-US" dirty="0" smtClean="0"/>
+              <a:t>Run in/near pipeline’s reprocessing environment</a:t>
+            </a:r>
+          </a:p>
+          <a:p>
+            <a:r>
+              <a:rPr lang="en-US" dirty="0" smtClean="0"/>
+              <a:t>Queries CRDS Server for Stored Results</a:t>
+            </a:r>
+          </a:p>
+          <a:p>
+            <a:pPr lvl="1"/>
+            <a:r>
+              <a:rPr lang="en-US" dirty="0" smtClean="0"/>
+              <a:t>Requires connection to CRDS server</a:t>
+            </a:r>
+          </a:p>
+          <a:p>
+            <a:pPr lvl="1"/>
+            <a:r>
+              <a:rPr lang="en-US" dirty="0" smtClean="0"/>
+              <a:t>Outputs list of affected IDs to </a:t>
+            </a:r>
+            <a:r>
+              <a:rPr lang="en-US" dirty="0" err="1" smtClean="0"/>
+              <a:t>stdout</a:t>
+            </a:r>
+            <a:endParaRPr lang="en-US" dirty="0" smtClean="0"/>
+          </a:p>
+          <a:p>
+            <a:pPr lvl="1"/>
+            <a:r>
+              <a:rPr lang="en-US" dirty="0" smtClean="0"/>
+              <a:t>Outputs log to </a:t>
+            </a:r>
+            <a:r>
+              <a:rPr lang="en-US" dirty="0" err="1" smtClean="0"/>
+              <a:t>stderr</a:t>
+            </a:r>
+            <a:endParaRPr lang="en-US" dirty="0" smtClean="0"/>
+          </a:p>
+          <a:p>
+            <a:pPr lvl="1"/>
+            <a:r>
+              <a:rPr lang="en-US" dirty="0" err="1" smtClean="0"/>
+              <a:t>Stateful</a:t>
+            </a:r>
+            <a:r>
+              <a:rPr lang="en-US" dirty="0" smtClean="0"/>
+              <a:t>:  </a:t>
+            </a:r>
+          </a:p>
+          <a:p>
+            <a:pPr lvl="2"/>
+            <a:r>
+              <a:rPr lang="en-US" dirty="0" smtClean="0"/>
+              <a:t>Remembers last context processed/queried</a:t>
+            </a:r>
+          </a:p>
+          <a:p>
+            <a:pPr lvl="2"/>
+            <a:r>
+              <a:rPr lang="en-US" dirty="0" smtClean="0"/>
+              <a:t>stores state in CRDS cache </a:t>
+            </a:r>
+            <a:r>
+              <a:rPr lang="en-US" dirty="0" err="1" smtClean="0"/>
+              <a:t>config</a:t>
+            </a:r>
+            <a:r>
+              <a:rPr lang="en-US" dirty="0" smtClean="0"/>
+              <a:t> area or file</a:t>
+            </a:r>
+            <a:endParaRPr lang="en-US" dirty="0" smtClean="0"/>
+          </a:p>
+          <a:p>
+            <a:r>
+              <a:rPr lang="en-US" dirty="0" smtClean="0"/>
+              <a:t>Queries limited to context transitions in history </a:t>
+            </a:r>
+          </a:p>
+          <a:p>
+            <a:r>
+              <a:rPr lang="en-US" dirty="0" smtClean="0"/>
+              <a:t>Requires one time initialization</a:t>
+            </a:r>
+          </a:p>
+          <a:p>
+            <a:pPr marL="0" indent="0">
+              <a:buNone/>
+            </a:pPr>
+            <a:endParaRPr lang="en-US" dirty="0"/>
+          </a:p>
+        </p:txBody>
+      </p:sp>
+    </p:spTree>
+    <p:extLst>
+      <p:ext uri="{BB962C8B-B14F-4D97-AF65-F5344CB8AC3E}">
+        <p14:creationId xmlns:p14="http://schemas.microsoft.com/office/powerpoint/2010/main" val="2283690490"/>
+      </p:ext>
+    </p:extLst>
+  </p:cSld>
+  <p:clrMapOvr>
+    <a:masterClrMapping/>
+  </p:clrMapOvr>
+</p:sld>
+</file>
+
+<file path=ppt/slides/slide15.xml><?xml version="1.0" encoding="utf-8"?>
+<p:sld xmlns:a="http://schemas.openxmlformats.org/drawingml/2006/main" xmlns:r="http://schemas.openxmlformats.org/officeDocument/2006/relationships" xmlns:p="http://schemas.openxmlformats.org/presentationml/2006/main">
+  <p:cSld>
+    <p:spTree>
+      <p:nvGrpSpPr>
+        <p:cNvPr id="1" name=""/>
+        <p:cNvGrpSpPr/>
+        <p:nvPr/>
+      </p:nvGrpSpPr>
+      <p:grpSpPr>
+        <a:xfrm>
+          <a:off x="0" y="0"/>
+          <a:ext cx="0" cy="0"/>
+          <a:chOff x="0" y="0"/>
+          <a:chExt cx="0" cy="0"/>
+        </a:xfrm>
+      </p:grpSpPr>
+      <p:sp>
+        <p:nvSpPr>
+          <p:cNvPr id="2" name="Title 1"/>
+          <p:cNvSpPr>
+            <a:spLocks noGrp="1"/>
+          </p:cNvSpPr>
+          <p:nvPr>
+            <p:ph type="title"/>
+          </p:nvPr>
+        </p:nvSpPr>
+        <p:spPr/>
+        <p:txBody>
+          <a:bodyPr>
+            <a:normAutofit fontScale="90000"/>
+          </a:bodyPr>
+          <a:lstStyle/>
+          <a:p>
+            <a:r>
+              <a:rPr lang="en-US" dirty="0" err="1" smtClean="0"/>
+              <a:t>query_affected_datasets</a:t>
+            </a:r>
+            <a:r>
+              <a:rPr lang="en-US" dirty="0" smtClean="0"/>
+              <a:t/>
+            </a:r>
+            <a:br>
+              <a:rPr lang="en-US" dirty="0" smtClean="0"/>
+            </a:br>
+            <a:r>
+              <a:rPr lang="en-US" dirty="0" smtClean="0"/>
+              <a:t>Initialization</a:t>
+            </a:r>
+            <a:endParaRPr lang="en-US" dirty="0"/>
+          </a:p>
+        </p:txBody>
+      </p:sp>
+      <p:sp>
+        <p:nvSpPr>
+          <p:cNvPr id="3" name="Content Placeholder 2"/>
+          <p:cNvSpPr>
+            <a:spLocks noGrp="1"/>
+          </p:cNvSpPr>
+          <p:nvPr>
+            <p:ph idx="1"/>
+          </p:nvPr>
+        </p:nvSpPr>
+        <p:spPr/>
+        <p:txBody>
+          <a:bodyPr>
+            <a:normAutofit fontScale="85000" lnSpcReduction="20000"/>
+          </a:bodyPr>
+          <a:lstStyle/>
+          <a:p>
+            <a:r>
+              <a:rPr lang="en-US" sz="2800" dirty="0" err="1" smtClean="0"/>
+              <a:t>setenv</a:t>
+            </a:r>
+            <a:r>
+              <a:rPr lang="en-US" sz="2800" dirty="0" smtClean="0"/>
+              <a:t> </a:t>
+            </a:r>
+            <a:r>
+              <a:rPr lang="en-US" sz="2400" dirty="0" smtClean="0"/>
+              <a:t>CRDS_SERVER_URL </a:t>
+            </a:r>
+            <a:r>
+              <a:rPr lang="en-US" sz="2400" dirty="0" smtClean="0">
+                <a:hlinkClick r:id="rId2"/>
+              </a:rPr>
+              <a:t>https</a:t>
+            </a:r>
+            <a:r>
+              <a:rPr lang="en-US" sz="2800" dirty="0" smtClean="0">
+                <a:hlinkClick r:id="rId2"/>
+              </a:rPr>
+              <a:t>://jwst-crds-b6it.stsci.edu</a:t>
+            </a:r>
+            <a:endParaRPr lang="en-US" sz="2800" dirty="0" smtClean="0"/>
+          </a:p>
+          <a:p>
+            <a:r>
+              <a:rPr lang="en-US" sz="2800" dirty="0" err="1" smtClean="0"/>
+              <a:t>setenv</a:t>
+            </a:r>
+            <a:r>
+              <a:rPr lang="en-US" sz="2800" dirty="0" smtClean="0"/>
+              <a:t> CRDS_PATH  $HOME/</a:t>
+            </a:r>
+            <a:r>
+              <a:rPr lang="en-US" sz="2800" dirty="0" err="1" smtClean="0"/>
+              <a:t>crds_cache_affected</a:t>
+            </a:r>
+            <a:endParaRPr lang="en-US" sz="2800" dirty="0" smtClean="0"/>
+          </a:p>
+          <a:p>
+            <a:r>
+              <a:rPr lang="en-US" sz="2800" dirty="0" smtClean="0"/>
+              <a:t>Fake </a:t>
+            </a:r>
+            <a:r>
+              <a:rPr lang="en-US" sz="2800" dirty="0" err="1" smtClean="0"/>
+              <a:t>Init</a:t>
+            </a:r>
+            <a:endParaRPr lang="en-US" sz="2800" dirty="0" smtClean="0"/>
+          </a:p>
+          <a:p>
+            <a:pPr lvl="1"/>
+            <a:r>
+              <a:rPr lang="en-US" sz="2400" dirty="0" err="1" smtClean="0"/>
+              <a:t>query_affected_datasets</a:t>
+            </a:r>
+            <a:r>
+              <a:rPr lang="en-US" sz="2400" dirty="0" smtClean="0"/>
+              <a:t> –list</a:t>
+            </a:r>
+          </a:p>
+          <a:p>
+            <a:pPr lvl="2"/>
+            <a:r>
+              <a:rPr lang="en-US" sz="2000" dirty="0" smtClean="0"/>
+              <a:t>List out context history with QAD indices</a:t>
+            </a:r>
+          </a:p>
+          <a:p>
+            <a:pPr lvl="2"/>
+            <a:r>
+              <a:rPr lang="en-US" sz="2000" dirty="0" smtClean="0"/>
+              <a:t>B6 only has two stored transitions,  last two</a:t>
+            </a:r>
+          </a:p>
+          <a:p>
+            <a:pPr lvl="1"/>
+            <a:r>
+              <a:rPr lang="en-US" sz="2400" dirty="0" err="1" smtClean="0"/>
+              <a:t>query_affected_datasets</a:t>
+            </a:r>
+            <a:r>
+              <a:rPr lang="en-US" sz="2400" dirty="0" smtClean="0"/>
+              <a:t> –x 40 –y 41</a:t>
+            </a:r>
+          </a:p>
+          <a:p>
+            <a:pPr lvl="2"/>
+            <a:r>
+              <a:rPr lang="en-US" sz="2000" dirty="0" smtClean="0"/>
+              <a:t>Initialize query state as first of two B6 transitions</a:t>
+            </a:r>
+          </a:p>
+          <a:p>
+            <a:pPr lvl="2"/>
+            <a:r>
+              <a:rPr lang="en-US" sz="2000" dirty="0" smtClean="0"/>
+              <a:t>41 (jwst_0183.pmap) is assumed to be current default</a:t>
+            </a:r>
+          </a:p>
+          <a:p>
+            <a:r>
+              <a:rPr lang="en-US" dirty="0" smtClean="0"/>
+              <a:t>Real </a:t>
+            </a:r>
+            <a:r>
+              <a:rPr lang="en-US" dirty="0" err="1" smtClean="0"/>
+              <a:t>Init</a:t>
+            </a:r>
+            <a:endParaRPr lang="en-US" dirty="0" smtClean="0"/>
+          </a:p>
+          <a:p>
+            <a:pPr lvl="1"/>
+            <a:r>
+              <a:rPr lang="en-US" dirty="0" err="1" smtClean="0"/>
+              <a:t>query_affected_datasets</a:t>
+            </a:r>
+            <a:r>
+              <a:rPr lang="en-US" dirty="0" smtClean="0"/>
+              <a:t> –reset</a:t>
+            </a:r>
+          </a:p>
+          <a:p>
+            <a:pPr lvl="1"/>
+            <a:r>
+              <a:rPr lang="en-US" dirty="0" smtClean="0"/>
+              <a:t>Sets “last seen” to end of history</a:t>
+            </a:r>
+          </a:p>
+          <a:p>
+            <a:pPr lvl="1"/>
+            <a:r>
+              <a:rPr lang="en-US" dirty="0" smtClean="0"/>
+              <a:t>Since already at end, requires a new context to demo!</a:t>
+            </a:r>
+          </a:p>
+        </p:txBody>
+      </p:sp>
+    </p:spTree>
+    <p:extLst>
+      <p:ext uri="{BB962C8B-B14F-4D97-AF65-F5344CB8AC3E}">
+        <p14:creationId xmlns:p14="http://schemas.microsoft.com/office/powerpoint/2010/main" val="1964756010"/>
+      </p:ext>
+    </p:extLst>
+  </p:cSld>
+  <p:clrMapOvr>
+    <a:masterClrMapping/>
+  </p:clrMapOvr>
+</p:sld>
+</file>
+
+<file path=ppt/slides/slide16.xml><?xml version="1.0" encoding="utf-8"?>
+<p:sld xmlns:a="http://schemas.openxmlformats.org/drawingml/2006/main" xmlns:r="http://schemas.openxmlformats.org/officeDocument/2006/relationships" xmlns:p="http://schemas.openxmlformats.org/presentationml/2006/main">
+  <p:cSld>
+    <p:spTree>
+      <p:nvGrpSpPr>
+        <p:cNvPr id="1" name=""/>
+        <p:cNvGrpSpPr/>
+        <p:nvPr/>
+      </p:nvGrpSpPr>
+      <p:grpSpPr>
+        <a:xfrm>
+          <a:off x="0" y="0"/>
+          <a:ext cx="0" cy="0"/>
+          <a:chOff x="0" y="0"/>
+          <a:chExt cx="0" cy="0"/>
+        </a:xfrm>
+      </p:grpSpPr>
+      <p:sp>
+        <p:nvSpPr>
+          <p:cNvPr id="2" name="Title 1"/>
+          <p:cNvSpPr>
+            <a:spLocks noGrp="1"/>
+          </p:cNvSpPr>
+          <p:nvPr>
+            <p:ph type="title"/>
+          </p:nvPr>
+        </p:nvSpPr>
+        <p:spPr/>
+        <p:txBody>
+          <a:bodyPr>
+            <a:normAutofit fontScale="90000"/>
+          </a:bodyPr>
+          <a:lstStyle/>
+          <a:p>
+            <a:r>
+              <a:rPr lang="en-US" dirty="0" err="1" smtClean="0"/>
+              <a:t>query_affected_datasets</a:t>
+            </a:r>
+            <a:r>
+              <a:rPr lang="en-US" dirty="0" smtClean="0"/>
+              <a:t/>
+            </a:r>
+            <a:br>
+              <a:rPr lang="en-US" dirty="0" smtClean="0"/>
+            </a:br>
+            <a:r>
+              <a:rPr lang="en-US" dirty="0" smtClean="0"/>
+              <a:t>single context update</a:t>
+            </a:r>
+            <a:endParaRPr lang="en-US" dirty="0"/>
+          </a:p>
+        </p:txBody>
+      </p:sp>
+      <p:sp>
+        <p:nvSpPr>
+          <p:cNvPr id="3" name="Content Placeholder 2"/>
+          <p:cNvSpPr>
+            <a:spLocks noGrp="1"/>
+          </p:cNvSpPr>
+          <p:nvPr>
+            <p:ph idx="1"/>
+          </p:nvPr>
+        </p:nvSpPr>
+        <p:spPr/>
+        <p:txBody>
+          <a:bodyPr>
+            <a:normAutofit fontScale="40000" lnSpcReduction="20000"/>
+          </a:bodyPr>
+          <a:lstStyle/>
+          <a:p>
+            <a:pPr marL="0" indent="0">
+              <a:buNone/>
+            </a:pPr>
+            <a:endParaRPr lang="en-US" dirty="0" smtClean="0"/>
+          </a:p>
+          <a:p>
+            <a:pPr marL="57150" indent="0">
+              <a:buNone/>
+            </a:pPr>
+            <a:r>
+              <a:rPr lang="en-US" sz="3800" dirty="0" smtClean="0"/>
+              <a:t>% </a:t>
+            </a:r>
+            <a:r>
+              <a:rPr lang="en-US" sz="3800" dirty="0" err="1"/>
+              <a:t>query_affected_datasets</a:t>
+            </a:r>
+            <a:r>
+              <a:rPr lang="en-US" sz="3800" dirty="0"/>
+              <a:t> </a:t>
+            </a:r>
+            <a:r>
+              <a:rPr lang="en-US" sz="3800" dirty="0" smtClean="0"/>
+              <a:t>–quiet</a:t>
+            </a:r>
+          </a:p>
+          <a:p>
+            <a:pPr marL="57150" indent="0">
+              <a:buNone/>
+            </a:pPr>
+            <a:endParaRPr lang="en-US" sz="3800" dirty="0"/>
+          </a:p>
+          <a:p>
+            <a:pPr marL="57150" indent="0">
+              <a:buNone/>
+            </a:pPr>
+            <a:r>
+              <a:rPr lang="en-US" sz="3800" dirty="0"/>
+              <a:t>CRDS  : INFO     Fetching effects for (41, '2016-05-18 09:40:19', 'jwst_0191.pmap', 'Delivered MIRI CDP5 files and corrections to several MIRI RMAPs to correct issues with selection of the reference files. Also, updated </a:t>
+            </a:r>
+            <a:r>
+              <a:rPr lang="en-US" sz="3800" dirty="0" err="1"/>
+              <a:t>NIRSpec</a:t>
+            </a:r>
+            <a:r>
+              <a:rPr lang="en-US" sz="3800" dirty="0"/>
+              <a:t> IMAP.')</a:t>
+            </a:r>
+          </a:p>
+          <a:p>
+            <a:pPr marL="57150" indent="0">
+              <a:buNone/>
+            </a:pPr>
+            <a:r>
+              <a:rPr lang="en-US" sz="3800" dirty="0"/>
+              <a:t>CRDS  : ERROR    CRDS server-side errors for 41 2016-05-21-11:40:11_0183_0191</a:t>
+            </a:r>
+          </a:p>
+          <a:p>
+            <a:pPr marL="57150" indent="0">
+              <a:buNone/>
+            </a:pPr>
+            <a:endParaRPr lang="en-US" sz="3800" dirty="0"/>
+          </a:p>
+          <a:p>
+            <a:pPr marL="57150" indent="0">
+              <a:buNone/>
+            </a:pPr>
+            <a:r>
+              <a:rPr lang="pl-PL" sz="3800" dirty="0"/>
+              <a:t>jw80600009001_02101_00001.mirimage</a:t>
+            </a:r>
+          </a:p>
+          <a:p>
+            <a:pPr marL="57150" indent="0">
+              <a:buNone/>
+            </a:pPr>
+            <a:r>
+              <a:rPr lang="pl-PL" sz="3800" dirty="0"/>
+              <a:t>jw80600016001_02101_00001.mirifulong</a:t>
+            </a:r>
+          </a:p>
+          <a:p>
+            <a:pPr marL="57150" indent="0">
+              <a:buNone/>
+            </a:pPr>
+            <a:r>
+              <a:rPr lang="pl-PL" sz="3800" dirty="0"/>
+              <a:t>jw80600018001_02101_00001.mirifulong</a:t>
+            </a:r>
+          </a:p>
+          <a:p>
+            <a:pPr marL="57150" indent="0">
+              <a:buNone/>
+            </a:pPr>
+            <a:r>
+              <a:rPr lang="pl-PL" sz="3800" dirty="0"/>
+              <a:t>jw80600018001_02101_00002.mirifulong</a:t>
+            </a:r>
+          </a:p>
+          <a:p>
+            <a:pPr marL="57150" indent="0">
+              <a:buNone/>
+            </a:pPr>
+            <a:r>
+              <a:rPr lang="pl-PL" sz="3800" dirty="0"/>
+              <a:t>jw80600018001_02101_00003.mirifulong</a:t>
+            </a:r>
+          </a:p>
+          <a:p>
+            <a:pPr marL="57150" indent="0">
+              <a:buNone/>
+            </a:pPr>
+            <a:r>
+              <a:rPr lang="pl-PL" sz="3800" dirty="0"/>
+              <a:t>jw80600020001_02101_00001.mirifulong</a:t>
+            </a:r>
+          </a:p>
+          <a:p>
+            <a:pPr marL="57150" indent="0">
+              <a:buNone/>
+            </a:pPr>
+            <a:r>
+              <a:rPr lang="pl-PL" sz="3800" dirty="0"/>
+              <a:t>jw80600039001_02102_00001.mirifulong</a:t>
+            </a:r>
+          </a:p>
+          <a:p>
+            <a:pPr marL="57150" indent="0">
+              <a:buNone/>
+            </a:pPr>
+            <a:r>
+              <a:rPr lang="pl-PL" sz="3800" dirty="0"/>
+              <a:t>jw80600039001_02102_00002.mirifulong</a:t>
+            </a:r>
+          </a:p>
+          <a:p>
+            <a:pPr marL="57150" indent="0">
+              <a:buNone/>
+            </a:pPr>
+            <a:r>
+              <a:rPr lang="pl-PL" sz="3800" dirty="0"/>
+              <a:t>jw80600050001_02102_00001.mirifulong</a:t>
+            </a:r>
+            <a:endParaRPr lang="en-US" sz="3800" dirty="0"/>
+          </a:p>
+        </p:txBody>
+      </p:sp>
+    </p:spTree>
+    <p:extLst>
+      <p:ext uri="{BB962C8B-B14F-4D97-AF65-F5344CB8AC3E}">
+        <p14:creationId xmlns:p14="http://schemas.microsoft.com/office/powerpoint/2010/main" val="4194281321"/>
+      </p:ext>
+    </p:extLst>
+  </p:cSld>
+  <p:clrMapOvr>
+    <a:masterClrMapping/>
+  </p:clrMapOvr>
+</p:sld>
+</file>
+
+<file path=ppt/slides/slide17.xml><?xml version="1.0" encoding="utf-8"?>
 <p:sld xmlns:a="http://schemas.openxmlformats.org/drawingml/2006/main" xmlns:r="http://schemas.openxmlformats.org/officeDocument/2006/relationships" xmlns:p="http://schemas.openxmlformats.org/presentationml/2006/main">
   <p:cSld>
     <p:spTree>
@@ -3335,494 +4342,6 @@
 </p:sld>
 </file>
 
-<file path=ppt/slides/slide12.xml><?xml version="1.0" encoding="utf-8"?>
-<p:sld xmlns:a="http://schemas.openxmlformats.org/drawingml/2006/main" xmlns:r="http://schemas.openxmlformats.org/officeDocument/2006/relationships" xmlns:p="http://schemas.openxmlformats.org/presentationml/2006/main">
-  <p:cSld>
-    <p:spTree>
-      <p:nvGrpSpPr>
-        <p:cNvPr id="1" name=""/>
-        <p:cNvGrpSpPr/>
-        <p:nvPr/>
-      </p:nvGrpSpPr>
-      <p:grpSpPr>
-        <a:xfrm>
-          <a:off x="0" y="0"/>
-          <a:ext cx="0" cy="0"/>
-          <a:chOff x="0" y="0"/>
-          <a:chExt cx="0" cy="0"/>
-        </a:xfrm>
-      </p:grpSpPr>
-      <p:sp>
-        <p:nvSpPr>
-          <p:cNvPr id="2" name="Title 1"/>
-          <p:cNvSpPr>
-            <a:spLocks noGrp="1"/>
-          </p:cNvSpPr>
-          <p:nvPr>
-            <p:ph type="title"/>
-          </p:nvPr>
-        </p:nvSpPr>
-        <p:spPr>
-          <a:xfrm>
-            <a:off x="457200" y="274638"/>
-            <a:ext cx="8229600" cy="743693"/>
-          </a:xfrm>
-        </p:spPr>
-        <p:txBody>
-          <a:bodyPr>
-            <a:normAutofit fontScale="90000"/>
-          </a:bodyPr>
-          <a:lstStyle/>
-          <a:p>
-            <a:r>
-              <a:rPr lang="en-US" dirty="0" err="1" smtClean="0"/>
-              <a:t>query_affected_datasets</a:t>
-            </a:r>
-            <a:endParaRPr lang="en-US" dirty="0"/>
-          </a:p>
-        </p:txBody>
-      </p:sp>
-      <p:sp>
-        <p:nvSpPr>
-          <p:cNvPr id="3" name="Content Placeholder 2"/>
-          <p:cNvSpPr>
-            <a:spLocks noGrp="1"/>
-          </p:cNvSpPr>
-          <p:nvPr>
-            <p:ph idx="1"/>
-          </p:nvPr>
-        </p:nvSpPr>
-        <p:spPr>
-          <a:xfrm>
-            <a:off x="457200" y="1461228"/>
-            <a:ext cx="8229600" cy="4525963"/>
-          </a:xfrm>
-        </p:spPr>
-        <p:txBody>
-          <a:bodyPr>
-            <a:normAutofit fontScale="92500" lnSpcReduction="20000"/>
-          </a:bodyPr>
-          <a:lstStyle/>
-          <a:p>
-            <a:r>
-              <a:rPr lang="en-US" dirty="0" smtClean="0"/>
-              <a:t>CRDS Client Script</a:t>
-            </a:r>
-          </a:p>
-          <a:p>
-            <a:r>
-              <a:rPr lang="en-US" dirty="0" smtClean="0"/>
-              <a:t>Run in/near pipeline’s reprocessing environment</a:t>
-            </a:r>
-          </a:p>
-          <a:p>
-            <a:r>
-              <a:rPr lang="en-US" dirty="0" smtClean="0"/>
-              <a:t>Queries CRDS Server for Stored Results</a:t>
-            </a:r>
-          </a:p>
-          <a:p>
-            <a:pPr lvl="1"/>
-            <a:r>
-              <a:rPr lang="en-US" dirty="0" smtClean="0"/>
-              <a:t>Requires connection to CRDS server</a:t>
-            </a:r>
-          </a:p>
-          <a:p>
-            <a:pPr lvl="1"/>
-            <a:r>
-              <a:rPr lang="en-US" dirty="0" smtClean="0"/>
-              <a:t>Stores state in *a* CRDS cache</a:t>
-            </a:r>
-          </a:p>
-          <a:p>
-            <a:pPr lvl="1"/>
-            <a:r>
-              <a:rPr lang="en-US" dirty="0" smtClean="0"/>
-              <a:t>Outputs list of affected IDs to </a:t>
-            </a:r>
-            <a:r>
-              <a:rPr lang="en-US" dirty="0" err="1" smtClean="0"/>
-              <a:t>stdout</a:t>
-            </a:r>
-            <a:endParaRPr lang="en-US" dirty="0" smtClean="0"/>
-          </a:p>
-          <a:p>
-            <a:pPr lvl="1"/>
-            <a:r>
-              <a:rPr lang="en-US" dirty="0" smtClean="0"/>
-              <a:t>Outputs log to </a:t>
-            </a:r>
-            <a:r>
-              <a:rPr lang="en-US" dirty="0" err="1" smtClean="0"/>
-              <a:t>stderr</a:t>
-            </a:r>
-            <a:endParaRPr lang="en-US" dirty="0" smtClean="0"/>
-          </a:p>
-          <a:p>
-            <a:pPr lvl="1"/>
-            <a:r>
-              <a:rPr lang="en-US" dirty="0" smtClean="0"/>
-              <a:t>Remembers last context processed/queried</a:t>
-            </a:r>
-          </a:p>
-          <a:p>
-            <a:r>
-              <a:rPr lang="en-US" dirty="0" smtClean="0"/>
-              <a:t>Queries limited to context transitions in history </a:t>
-            </a:r>
-          </a:p>
-          <a:p>
-            <a:r>
-              <a:rPr lang="en-US" dirty="0" smtClean="0"/>
-              <a:t>Requires one time </a:t>
-            </a:r>
-            <a:r>
-              <a:rPr lang="en-US" dirty="0" err="1" smtClean="0"/>
-              <a:t>inititialization</a:t>
-            </a:r>
-            <a:endParaRPr lang="en-US" dirty="0" smtClean="0"/>
-          </a:p>
-          <a:p>
-            <a:pPr marL="0" indent="0">
-              <a:buNone/>
-            </a:pPr>
-            <a:endParaRPr lang="en-US" dirty="0"/>
-          </a:p>
-        </p:txBody>
-      </p:sp>
-    </p:spTree>
-    <p:extLst>
-      <p:ext uri="{BB962C8B-B14F-4D97-AF65-F5344CB8AC3E}">
-        <p14:creationId xmlns:p14="http://schemas.microsoft.com/office/powerpoint/2010/main" val="2283690490"/>
-      </p:ext>
-    </p:extLst>
-  </p:cSld>
-  <p:clrMapOvr>
-    <a:masterClrMapping/>
-  </p:clrMapOvr>
-</p:sld>
-</file>
-
-<file path=ppt/slides/slide13.xml><?xml version="1.0" encoding="utf-8"?>
-<p:sld xmlns:a="http://schemas.openxmlformats.org/drawingml/2006/main" xmlns:r="http://schemas.openxmlformats.org/officeDocument/2006/relationships" xmlns:p="http://schemas.openxmlformats.org/presentationml/2006/main">
-  <p:cSld>
-    <p:spTree>
-      <p:nvGrpSpPr>
-        <p:cNvPr id="1" name=""/>
-        <p:cNvGrpSpPr/>
-        <p:nvPr/>
-      </p:nvGrpSpPr>
-      <p:grpSpPr>
-        <a:xfrm>
-          <a:off x="0" y="0"/>
-          <a:ext cx="0" cy="0"/>
-          <a:chOff x="0" y="0"/>
-          <a:chExt cx="0" cy="0"/>
-        </a:xfrm>
-      </p:grpSpPr>
-      <p:sp>
-        <p:nvSpPr>
-          <p:cNvPr id="2" name="Title 1"/>
-          <p:cNvSpPr>
-            <a:spLocks noGrp="1"/>
-          </p:cNvSpPr>
-          <p:nvPr>
-            <p:ph type="title"/>
-          </p:nvPr>
-        </p:nvSpPr>
-        <p:spPr/>
-        <p:txBody>
-          <a:bodyPr>
-            <a:normAutofit fontScale="90000"/>
-          </a:bodyPr>
-          <a:lstStyle/>
-          <a:p>
-            <a:r>
-              <a:rPr lang="en-US" dirty="0" err="1" smtClean="0"/>
-              <a:t>query_affected_datasets</a:t>
-            </a:r>
-            <a:r>
-              <a:rPr lang="en-US" dirty="0" smtClean="0"/>
-              <a:t/>
-            </a:r>
-            <a:br>
-              <a:rPr lang="en-US" dirty="0" smtClean="0"/>
-            </a:br>
-            <a:r>
-              <a:rPr lang="en-US" dirty="0" smtClean="0"/>
-              <a:t>Initialization</a:t>
-            </a:r>
-            <a:endParaRPr lang="en-US" dirty="0"/>
-          </a:p>
-        </p:txBody>
-      </p:sp>
-      <p:sp>
-        <p:nvSpPr>
-          <p:cNvPr id="3" name="Content Placeholder 2"/>
-          <p:cNvSpPr>
-            <a:spLocks noGrp="1"/>
-          </p:cNvSpPr>
-          <p:nvPr>
-            <p:ph idx="1"/>
-          </p:nvPr>
-        </p:nvSpPr>
-        <p:spPr/>
-        <p:txBody>
-          <a:bodyPr>
-            <a:normAutofit fontScale="85000" lnSpcReduction="20000"/>
-          </a:bodyPr>
-          <a:lstStyle/>
-          <a:p>
-            <a:r>
-              <a:rPr lang="en-US" sz="2800" dirty="0" err="1" smtClean="0"/>
-              <a:t>setenv</a:t>
-            </a:r>
-            <a:r>
-              <a:rPr lang="en-US" sz="2800" dirty="0" smtClean="0"/>
-              <a:t> </a:t>
-            </a:r>
-            <a:r>
-              <a:rPr lang="en-US" sz="2400" dirty="0" smtClean="0"/>
-              <a:t>CRDS_SERVER_URL </a:t>
-            </a:r>
-            <a:r>
-              <a:rPr lang="en-US" sz="2400" dirty="0" smtClean="0">
-                <a:hlinkClick r:id="rId2"/>
-              </a:rPr>
-              <a:t>https</a:t>
-            </a:r>
-            <a:r>
-              <a:rPr lang="en-US" sz="2800" dirty="0" smtClean="0">
-                <a:hlinkClick r:id="rId2"/>
-              </a:rPr>
-              <a:t>://jwst-crds-b6it.stsci.edu</a:t>
-            </a:r>
-            <a:endParaRPr lang="en-US" sz="2800" dirty="0" smtClean="0"/>
-          </a:p>
-          <a:p>
-            <a:r>
-              <a:rPr lang="en-US" sz="2800" dirty="0" err="1" smtClean="0"/>
-              <a:t>setenv</a:t>
-            </a:r>
-            <a:r>
-              <a:rPr lang="en-US" sz="2800" dirty="0" smtClean="0"/>
-              <a:t> CRDS_PATH  $HOME/</a:t>
-            </a:r>
-            <a:r>
-              <a:rPr lang="en-US" sz="2800" dirty="0" err="1" smtClean="0"/>
-              <a:t>crds_cache_affected</a:t>
-            </a:r>
-            <a:endParaRPr lang="en-US" sz="2800" dirty="0" smtClean="0"/>
-          </a:p>
-          <a:p>
-            <a:r>
-              <a:rPr lang="en-US" sz="2800" dirty="0" smtClean="0"/>
-              <a:t>Fake </a:t>
-            </a:r>
-            <a:r>
-              <a:rPr lang="en-US" sz="2800" dirty="0" err="1" smtClean="0"/>
-              <a:t>Init</a:t>
-            </a:r>
-            <a:endParaRPr lang="en-US" sz="2800" dirty="0" smtClean="0"/>
-          </a:p>
-          <a:p>
-            <a:pPr lvl="1"/>
-            <a:r>
-              <a:rPr lang="en-US" sz="2400" dirty="0" err="1" smtClean="0"/>
-              <a:t>query_affected_datasets</a:t>
-            </a:r>
-            <a:r>
-              <a:rPr lang="en-US" sz="2400" dirty="0" smtClean="0"/>
-              <a:t> –list</a:t>
-            </a:r>
-          </a:p>
-          <a:p>
-            <a:pPr lvl="2"/>
-            <a:r>
-              <a:rPr lang="en-US" sz="2000" dirty="0" smtClean="0"/>
-              <a:t>List out context history with QAD indices</a:t>
-            </a:r>
-          </a:p>
-          <a:p>
-            <a:pPr lvl="2"/>
-            <a:r>
-              <a:rPr lang="en-US" sz="2000" dirty="0" smtClean="0"/>
-              <a:t>B6 only has two stored transitions,  last two</a:t>
-            </a:r>
-          </a:p>
-          <a:p>
-            <a:pPr lvl="1"/>
-            <a:r>
-              <a:rPr lang="en-US" sz="2400" dirty="0" err="1" smtClean="0"/>
-              <a:t>query_affected_datasets</a:t>
-            </a:r>
-            <a:r>
-              <a:rPr lang="en-US" sz="2400" dirty="0" smtClean="0"/>
-              <a:t> –x 40 –y 41</a:t>
-            </a:r>
-          </a:p>
-          <a:p>
-            <a:pPr lvl="2"/>
-            <a:r>
-              <a:rPr lang="en-US" sz="2000" dirty="0" smtClean="0"/>
-              <a:t>Initialize query state as first of two B6 transitions</a:t>
-            </a:r>
-          </a:p>
-          <a:p>
-            <a:pPr lvl="2"/>
-            <a:r>
-              <a:rPr lang="en-US" sz="2000" dirty="0" smtClean="0"/>
-              <a:t>41 (jwst_0183.pmap) is assumed to be current default</a:t>
-            </a:r>
-          </a:p>
-          <a:p>
-            <a:r>
-              <a:rPr lang="en-US" dirty="0" smtClean="0"/>
-              <a:t>Real </a:t>
-            </a:r>
-            <a:r>
-              <a:rPr lang="en-US" dirty="0" err="1" smtClean="0"/>
-              <a:t>Init</a:t>
-            </a:r>
-            <a:r>
-              <a:rPr lang="en-US" dirty="0" smtClean="0"/>
-              <a:t> / Reset</a:t>
-            </a:r>
-          </a:p>
-          <a:p>
-            <a:pPr lvl="1"/>
-            <a:r>
-              <a:rPr lang="en-US" dirty="0" err="1" smtClean="0"/>
-              <a:t>query_affected_datasets</a:t>
-            </a:r>
-            <a:r>
-              <a:rPr lang="en-US" dirty="0" smtClean="0"/>
-              <a:t> –reset</a:t>
-            </a:r>
-          </a:p>
-          <a:p>
-            <a:pPr lvl="1"/>
-            <a:r>
-              <a:rPr lang="en-US" dirty="0" smtClean="0"/>
-              <a:t>Sets last seen context recorded in cache to end of history</a:t>
-            </a:r>
-          </a:p>
-          <a:p>
-            <a:pPr lvl="1"/>
-            <a:r>
-              <a:rPr lang="en-US" dirty="0" smtClean="0"/>
-              <a:t>Since already at end, requires a new context to demo!</a:t>
-            </a:r>
-          </a:p>
-        </p:txBody>
-      </p:sp>
-    </p:spTree>
-    <p:extLst>
-      <p:ext uri="{BB962C8B-B14F-4D97-AF65-F5344CB8AC3E}">
-        <p14:creationId xmlns:p14="http://schemas.microsoft.com/office/powerpoint/2010/main" val="1964756010"/>
-      </p:ext>
-    </p:extLst>
-  </p:cSld>
-  <p:clrMapOvr>
-    <a:masterClrMapping/>
-  </p:clrMapOvr>
-</p:sld>
-</file>
-
-<file path=ppt/slides/slide14.xml><?xml version="1.0" encoding="utf-8"?>
-<p:sld xmlns:a="http://schemas.openxmlformats.org/drawingml/2006/main" xmlns:r="http://schemas.openxmlformats.org/officeDocument/2006/relationships" xmlns:p="http://schemas.openxmlformats.org/presentationml/2006/main">
-  <p:cSld>
-    <p:spTree>
-      <p:nvGrpSpPr>
-        <p:cNvPr id="1" name=""/>
-        <p:cNvGrpSpPr/>
-        <p:nvPr/>
-      </p:nvGrpSpPr>
-      <p:grpSpPr>
-        <a:xfrm>
-          <a:off x="0" y="0"/>
-          <a:ext cx="0" cy="0"/>
-          <a:chOff x="0" y="0"/>
-          <a:chExt cx="0" cy="0"/>
-        </a:xfrm>
-      </p:grpSpPr>
-      <p:sp>
-        <p:nvSpPr>
-          <p:cNvPr id="2" name="Title 1"/>
-          <p:cNvSpPr>
-            <a:spLocks noGrp="1"/>
-          </p:cNvSpPr>
-          <p:nvPr>
-            <p:ph type="title"/>
-          </p:nvPr>
-        </p:nvSpPr>
-        <p:spPr/>
-        <p:txBody>
-          <a:bodyPr>
-            <a:normAutofit fontScale="90000"/>
-          </a:bodyPr>
-          <a:lstStyle/>
-          <a:p>
-            <a:r>
-              <a:rPr lang="en-US" dirty="0" err="1" smtClean="0"/>
-              <a:t>query_affected_datasets</a:t>
-            </a:r>
-            <a:r>
-              <a:rPr lang="en-US" dirty="0" smtClean="0"/>
-              <a:t/>
-            </a:r>
-            <a:br>
-              <a:rPr lang="en-US" dirty="0" smtClean="0"/>
-            </a:br>
-            <a:r>
-              <a:rPr lang="en-US" dirty="0" smtClean="0"/>
-              <a:t>single context update</a:t>
-            </a:r>
-            <a:endParaRPr lang="en-US" dirty="0"/>
-          </a:p>
-        </p:txBody>
-      </p:sp>
-      <p:sp>
-        <p:nvSpPr>
-          <p:cNvPr id="3" name="Content Placeholder 2"/>
-          <p:cNvSpPr>
-            <a:spLocks noGrp="1"/>
-          </p:cNvSpPr>
-          <p:nvPr>
-            <p:ph idx="1"/>
-          </p:nvPr>
-        </p:nvSpPr>
-        <p:spPr/>
-        <p:txBody>
-          <a:bodyPr/>
-          <a:lstStyle/>
-          <a:p>
-            <a:r>
-              <a:rPr lang="en-US" dirty="0" err="1" smtClean="0"/>
-              <a:t>query_affected_datasets</a:t>
-            </a:r>
-            <a:r>
-              <a:rPr lang="en-US" dirty="0" smtClean="0"/>
-              <a:t> --quiet</a:t>
-            </a:r>
-            <a:endParaRPr lang="en-US" dirty="0"/>
-          </a:p>
-        </p:txBody>
-      </p:sp>
-    </p:spTree>
-    <p:extLst>
-      <p:ext uri="{BB962C8B-B14F-4D97-AF65-F5344CB8AC3E}">
-        <p14:creationId xmlns:p14="http://schemas.microsoft.com/office/powerpoint/2010/main" val="4194281321"/>
-      </p:ext>
-    </p:extLst>
-  </p:cSld>
-  <p:clrMapOvr>
-    <a:masterClrMapping/>
-  </p:clrMapOvr>
-</p:sld>
-</file>
-
 <file path=ppt/slides/slide2.xml><?xml version="1.0" encoding="utf-8"?>
 <p:sld xmlns:a="http://schemas.openxmlformats.org/drawingml/2006/main" xmlns:r="http://schemas.openxmlformats.org/officeDocument/2006/relationships" xmlns:p="http://schemas.openxmlformats.org/presentationml/2006/main">
   <p:cSld>
@@ -3977,6 +4496,64 @@
         </p:nvSpPr>
         <p:spPr>
           <a:xfrm>
+            <a:off x="525845" y="2369105"/>
+            <a:ext cx="8229600" cy="1143000"/>
+          </a:xfrm>
+        </p:spPr>
+        <p:txBody>
+          <a:bodyPr/>
+          <a:lstStyle/>
+          <a:p>
+            <a:r>
+              <a:rPr lang="en-US" dirty="0" smtClean="0"/>
+              <a:t>Basic Program</a:t>
+            </a:r>
+            <a:endParaRPr lang="en-US" dirty="0"/>
+          </a:p>
+        </p:txBody>
+      </p:sp>
+    </p:spTree>
+    <p:extLst>
+      <p:ext uri="{BB962C8B-B14F-4D97-AF65-F5344CB8AC3E}">
+        <p14:creationId xmlns:p14="http://schemas.microsoft.com/office/powerpoint/2010/main" val="4132318632"/>
+      </p:ext>
+    </p:extLst>
+  </p:cSld>
+  <p:clrMapOvr>
+    <a:masterClrMapping/>
+  </p:clrMapOvr>
+</p:sld>
+</file>
+
+<file path=ppt/slides/slide4.xml><?xml version="1.0" encoding="utf-8"?>
+<p:sld xmlns:a="http://schemas.openxmlformats.org/drawingml/2006/main" xmlns:r="http://schemas.openxmlformats.org/officeDocument/2006/relationships" xmlns:p="http://schemas.openxmlformats.org/presentationml/2006/main">
+  <p:cSld>
+    <p:spTree>
+      <p:nvGrpSpPr>
+        <p:cNvPr id="1" name=""/>
+        <p:cNvGrpSpPr/>
+        <p:nvPr/>
+      </p:nvGrpSpPr>
+      <p:grpSpPr>
+        <a:xfrm>
+          <a:off x="0" y="0"/>
+          <a:ext cx="0" cy="0"/>
+          <a:chOff x="0" y="0"/>
+          <a:chExt cx="0" cy="0"/>
+        </a:xfrm>
+      </p:grpSpPr>
+      <p:sp>
+        <p:nvSpPr>
+          <p:cNvPr id="2" name="Title 1"/>
+          <p:cNvSpPr>
+            <a:spLocks noGrp="1"/>
+          </p:cNvSpPr>
+          <p:nvPr>
+            <p:ph type="title"/>
+          </p:nvPr>
+        </p:nvSpPr>
+        <p:spPr>
+          <a:xfrm>
             <a:off x="457200" y="452090"/>
             <a:ext cx="8229600" cy="1143000"/>
           </a:xfrm>
@@ -4022,12 +4599,16 @@
           <a:p>
             <a:pPr lvl="1"/>
             <a:r>
+              <a:rPr lang="en-US" dirty="0" smtClean="0"/>
+              <a:t>One of many </a:t>
+            </a:r>
+            <a:r>
               <a:rPr lang="en-US" dirty="0" err="1" smtClean="0"/>
               <a:t>crds.bestefs</a:t>
             </a:r>
             <a:r>
               <a:rPr lang="en-US" dirty="0" smtClean="0"/>
-              <a:t> mode</a:t>
+              <a:t> modes</a:t>
             </a:r>
           </a:p>
           <a:p>
@@ -4068,21 +4649,29 @@
             </a:r>
             <a:r>
               <a:rPr lang="en-US" dirty="0" smtClean="0"/>
-              <a:t>ataset parameters from archive </a:t>
-            </a:r>
-            <a:r>
-              <a:rPr lang="en-US" smtClean="0"/>
-              <a:t>web service</a:t>
-            </a:r>
-            <a:endParaRPr lang="en-US" dirty="0" smtClean="0"/>
+              <a:t>ataset parameters from archive web service</a:t>
+            </a:r>
           </a:p>
           <a:p>
             <a:pPr lvl="2"/>
             <a:r>
               <a:rPr lang="en-US" dirty="0" smtClean="0"/>
-              <a:t>Output list of affected datasets</a:t>
-            </a:r>
-            <a:endParaRPr lang="en-US" dirty="0" smtClean="0"/>
+              <a:t>Output </a:t>
+            </a:r>
+          </a:p>
+          <a:p>
+            <a:pPr lvl="3"/>
+            <a:r>
+              <a:rPr lang="en-US" dirty="0" smtClean="0"/>
+              <a:t>list of affected datasets</a:t>
+            </a:r>
+          </a:p>
+          <a:p>
+            <a:pPr lvl="3"/>
+            <a:r>
+              <a:rPr lang="en-US" dirty="0" smtClean="0"/>
+              <a:t>error log</a:t>
+            </a:r>
           </a:p>
           <a:p>
             <a:pPr marL="457200" lvl="1" indent="0">
@@ -4119,7 +4708,7 @@
 </p:sld>
 </file>
 
-<file path=ppt/slides/slide4.xml><?xml version="1.0" encoding="utf-8"?>
+<file path=ppt/slides/slide5.xml><?xml version="1.0" encoding="utf-8"?>
 <p:sld xmlns:a="http://schemas.openxmlformats.org/drawingml/2006/main" xmlns:r="http://schemas.openxmlformats.org/officeDocument/2006/relationships" xmlns:p="http://schemas.openxmlformats.org/presentationml/2006/main">
   <p:cSld>
     <p:spTree>
@@ -4186,7 +4775,7 @@
 </p:sld>
 </file>
 
-<file path=ppt/slides/slide5.xml><?xml version="1.0" encoding="utf-8"?>
+<file path=ppt/slides/slide6.xml><?xml version="1.0" encoding="utf-8"?>
 <p:sld xmlns:a="http://schemas.openxmlformats.org/drawingml/2006/main" xmlns:r="http://schemas.openxmlformats.org/officeDocument/2006/relationships" xmlns:p="http://schemas.openxmlformats.org/presentationml/2006/main">
   <p:cSld>
     <p:spTree>
@@ -4401,397 +4990,6 @@
 </p:sld>
 </file>
 
-<file path=ppt/slides/slide6.xml><?xml version="1.0" encoding="utf-8"?>
-<p:sld xmlns:a="http://schemas.openxmlformats.org/drawingml/2006/main" xmlns:r="http://schemas.openxmlformats.org/officeDocument/2006/relationships" xmlns:p="http://schemas.openxmlformats.org/presentationml/2006/main">
-  <p:cSld>
-    <p:spTree>
-      <p:nvGrpSpPr>
-        <p:cNvPr id="1" name=""/>
-        <p:cNvGrpSpPr/>
-        <p:nvPr/>
-      </p:nvGrpSpPr>
-      <p:grpSpPr>
-        <a:xfrm>
-          <a:off x="0" y="0"/>
-          <a:ext cx="0" cy="0"/>
-          <a:chOff x="0" y="0"/>
-          <a:chExt cx="0" cy="0"/>
-        </a:xfrm>
-      </p:grpSpPr>
-      <p:sp>
-        <p:nvSpPr>
-          <p:cNvPr id="2" name="Title 1"/>
-          <p:cNvSpPr>
-            <a:spLocks noGrp="1"/>
-          </p:cNvSpPr>
-          <p:nvPr>
-            <p:ph type="title"/>
-          </p:nvPr>
-        </p:nvSpPr>
-        <p:spPr>
-          <a:xfrm>
-            <a:off x="457200" y="137335"/>
-            <a:ext cx="8229600" cy="480529"/>
-          </a:xfrm>
-        </p:spPr>
-        <p:txBody>
-          <a:bodyPr>
-            <a:normAutofit fontScale="90000"/>
-          </a:bodyPr>
-          <a:lstStyle/>
-          <a:p>
-            <a:r>
-              <a:rPr lang="en-US" dirty="0" err="1" smtClean="0"/>
-              <a:t>crds.bestrefs</a:t>
-            </a:r>
-            <a:r>
-              <a:rPr lang="en-US" dirty="0" smtClean="0"/>
-              <a:t> output</a:t>
-            </a:r>
-            <a:endParaRPr lang="en-US" dirty="0"/>
-          </a:p>
-        </p:txBody>
-      </p:sp>
-      <p:sp>
-        <p:nvSpPr>
-          <p:cNvPr id="3" name="Content Placeholder 2"/>
-          <p:cNvSpPr>
-            <a:spLocks noGrp="1"/>
-          </p:cNvSpPr>
-          <p:nvPr>
-            <p:ph idx="1"/>
-          </p:nvPr>
-        </p:nvSpPr>
-        <p:spPr>
-          <a:xfrm>
-            <a:off x="549154" y="972563"/>
-            <a:ext cx="8137645" cy="5492121"/>
-          </a:xfrm>
-        </p:spPr>
-        <p:txBody>
-          <a:bodyPr>
-            <a:noAutofit/>
-          </a:bodyPr>
-          <a:lstStyle/>
-          <a:p>
-            <a:pPr marL="0" indent="0">
-              <a:buNone/>
-            </a:pPr>
-            <a:r>
-              <a:rPr lang="en-US" sz="1200" dirty="0"/>
-              <a:t>CRDS  : INFO     Mapping differences from 'jwst_0183.pmap' --&gt; 'jwst_0190.pmap' affect:</a:t>
-            </a:r>
-          </a:p>
-          <a:p>
-            <a:pPr marL="0" indent="0">
-              <a:buNone/>
-            </a:pPr>
-            <a:r>
-              <a:rPr lang="en-US" sz="1200" dirty="0"/>
-              <a:t> {'</a:t>
-            </a:r>
-            <a:r>
-              <a:rPr lang="en-US" sz="1200" dirty="0" err="1"/>
-              <a:t>miri</a:t>
-            </a:r>
-            <a:r>
-              <a:rPr lang="en-US" sz="1200" dirty="0"/>
-              <a:t>': ['</a:t>
-            </a:r>
-            <a:r>
-              <a:rPr lang="en-US" sz="1200" dirty="0" err="1"/>
-              <a:t>readnoise</a:t>
-            </a:r>
-            <a:r>
-              <a:rPr lang="en-US" sz="1200" dirty="0"/>
-              <a:t>', 'dark', 'flat', '</a:t>
-            </a:r>
-            <a:r>
-              <a:rPr lang="en-US" sz="1200" dirty="0" err="1"/>
-              <a:t>lastframe</a:t>
-            </a:r>
-            <a:r>
-              <a:rPr lang="en-US" sz="1200" dirty="0"/>
-              <a:t>', 'area', 'reset', '</a:t>
-            </a:r>
-            <a:r>
-              <a:rPr lang="en-US" sz="1200" dirty="0" err="1"/>
-              <a:t>photom</a:t>
-            </a:r>
-            <a:r>
-              <a:rPr lang="en-US" sz="1200" dirty="0"/>
-              <a:t>']}</a:t>
-            </a:r>
-          </a:p>
-          <a:p>
-            <a:pPr marL="0" indent="0">
-              <a:buNone/>
-            </a:pPr>
-            <a:r>
-              <a:rPr lang="en-US" sz="1200" dirty="0"/>
-              <a:t>CRDS  : INFO     Checking all dates due to header changes or file deletions.</a:t>
-            </a:r>
-          </a:p>
-          <a:p>
-            <a:pPr marL="0" indent="0">
-              <a:buNone/>
-            </a:pPr>
-            <a:r>
-              <a:rPr lang="en-US" sz="1200" dirty="0"/>
-              <a:t>CRDS  : INFO     Computing </a:t>
-            </a:r>
-            <a:r>
-              <a:rPr lang="en-US" sz="1200" dirty="0" err="1"/>
-              <a:t>bestrefs</a:t>
-            </a:r>
-            <a:r>
-              <a:rPr lang="en-US" sz="1200" dirty="0"/>
-              <a:t> for </a:t>
-            </a:r>
-            <a:r>
-              <a:rPr lang="en-US" sz="1200" dirty="0" err="1"/>
-              <a:t>db</a:t>
-            </a:r>
-            <a:r>
-              <a:rPr lang="en-US" sz="1200" dirty="0"/>
-              <a:t> datasets for </a:t>
-            </a:r>
-            <a:r>
-              <a:rPr lang="en-US" sz="1200" dirty="0" err="1"/>
-              <a:t>dict_keys</a:t>
-            </a:r>
-            <a:r>
-              <a:rPr lang="en-US" sz="1200" dirty="0"/>
-              <a:t>(['</a:t>
-            </a:r>
-            <a:r>
-              <a:rPr lang="en-US" sz="1200" dirty="0" err="1"/>
-              <a:t>miri</a:t>
-            </a:r>
-            <a:r>
-              <a:rPr lang="en-US" sz="1200" dirty="0"/>
-              <a:t>'])</a:t>
-            </a:r>
-          </a:p>
-          <a:p>
-            <a:pPr marL="0" indent="0">
-              <a:buNone/>
-            </a:pPr>
-            <a:r>
-              <a:rPr lang="en-US" sz="1200" dirty="0"/>
-              <a:t>CRDS  : INFO     Dumping dataset parameters for '</a:t>
-            </a:r>
-            <a:r>
-              <a:rPr lang="en-US" sz="1200" dirty="0" err="1"/>
-              <a:t>miri</a:t>
-            </a:r>
-            <a:r>
-              <a:rPr lang="en-US" sz="1200" dirty="0"/>
-              <a:t>' from CRDS server at 'https://jwst-crds-b6it.stsci.edu' since '1900-01-01 00:00:00'</a:t>
-            </a:r>
-          </a:p>
-          <a:p>
-            <a:pPr marL="0" indent="0">
-              <a:buNone/>
-            </a:pPr>
-            <a:r>
-              <a:rPr lang="en-US" sz="1200" dirty="0"/>
-              <a:t>CRDS  : INFO     Downloaded  335 dataset ids for '</a:t>
-            </a:r>
-            <a:r>
-              <a:rPr lang="en-US" sz="1200" dirty="0" err="1"/>
-              <a:t>miri</a:t>
-            </a:r>
-            <a:r>
-              <a:rPr lang="en-US" sz="1200" dirty="0"/>
-              <a:t>' since '1900-01-01 00:00:</a:t>
-            </a:r>
-            <a:r>
-              <a:rPr lang="en-US" sz="1200" dirty="0" smtClean="0"/>
-              <a:t>00’</a:t>
-            </a:r>
-          </a:p>
-          <a:p>
-            <a:pPr marL="0" indent="0">
-              <a:buNone/>
-            </a:pPr>
-            <a:endParaRPr lang="en-US" sz="1200" dirty="0"/>
-          </a:p>
-          <a:p>
-            <a:pPr marL="0" indent="0">
-              <a:buNone/>
-            </a:pPr>
-            <a:r>
-              <a:rPr lang="en-US" sz="1200" dirty="0" smtClean="0"/>
-              <a:t>CRDS  </a:t>
-            </a:r>
-            <a:r>
-              <a:rPr lang="en-US" sz="1200" dirty="0"/>
-              <a:t>: ERROR    instrument='MIRI' type='FLAT' data='JW80600039001_02102_00001.MIRIFULONG:JW80600039001_02102_00001.MIRIFULONG' ::  New: No match found =&gt; 'N/A'.</a:t>
-            </a:r>
-          </a:p>
-          <a:p>
-            <a:pPr marL="0" indent="0">
-              <a:buNone/>
-            </a:pPr>
-            <a:r>
-              <a:rPr lang="en-US" sz="1200" dirty="0" smtClean="0"/>
-              <a:t>…</a:t>
-            </a:r>
-          </a:p>
-          <a:p>
-            <a:pPr marL="0" indent="0">
-              <a:buNone/>
-            </a:pPr>
-            <a:r>
-              <a:rPr lang="en-US" sz="1200" dirty="0" smtClean="0"/>
-              <a:t>CRDS  </a:t>
-            </a:r>
-            <a:r>
-              <a:rPr lang="en-US" sz="1200" dirty="0"/>
-              <a:t>: ERROR    instrument='MIRI' type='FLAT' data='JW99001001001_02102_00001.MIRIMAGE:JW99001001001_02102_00001.MIRIMAGE' ::  Old: No match found =&gt; 'N/A'.</a:t>
-            </a:r>
-          </a:p>
-          <a:p>
-            <a:pPr marL="0" indent="0">
-              <a:buNone/>
-            </a:pPr>
-            <a:endParaRPr lang="en-US" sz="1200" dirty="0" smtClean="0"/>
-          </a:p>
-          <a:p>
-            <a:pPr marL="0" indent="0">
-              <a:buNone/>
-            </a:pPr>
-            <a:r>
-              <a:rPr lang="en-US" sz="1200" dirty="0" smtClean="0"/>
-              <a:t>CRDS  </a:t>
-            </a:r>
-            <a:r>
-              <a:rPr lang="en-US" sz="1200" dirty="0"/>
-              <a:t>: INFO     Updated exposure counts:</a:t>
-            </a:r>
-          </a:p>
-          <a:p>
-            <a:pPr marL="0" indent="0">
-              <a:buNone/>
-            </a:pPr>
-            <a:r>
-              <a:rPr lang="it-IT" sz="1200" dirty="0"/>
-              <a:t> {'MIRI': {'area': 77, '</a:t>
-            </a:r>
-            <a:r>
-              <a:rPr lang="it-IT" sz="1200" dirty="0" err="1"/>
-              <a:t>flat</a:t>
-            </a:r>
-            <a:r>
-              <a:rPr lang="it-IT" sz="1200" dirty="0"/>
-              <a:t>': 90, '</a:t>
-            </a:r>
-            <a:r>
-              <a:rPr lang="it-IT" sz="1200" dirty="0" err="1"/>
-              <a:t>photom</a:t>
-            </a:r>
-            <a:r>
-              <a:rPr lang="it-IT" sz="1200" dirty="0"/>
-              <a:t>': 110}}</a:t>
-            </a:r>
-          </a:p>
-          <a:p>
-            <a:pPr marL="0" indent="0">
-              <a:buNone/>
-            </a:pPr>
-            <a:r>
-              <a:rPr lang="it-IT" sz="1200" dirty="0"/>
-              <a:t>CRDS  : INFO     </a:t>
-            </a:r>
-            <a:r>
-              <a:rPr lang="it-IT" sz="1200" dirty="0" err="1"/>
-              <a:t>Affected</a:t>
-            </a:r>
-            <a:r>
-              <a:rPr lang="it-IT" sz="1200" dirty="0"/>
-              <a:t> </a:t>
-            </a:r>
-            <a:r>
-              <a:rPr lang="it-IT" sz="1200" dirty="0" err="1"/>
-              <a:t>products</a:t>
-            </a:r>
-            <a:r>
-              <a:rPr lang="it-IT" sz="1200" dirty="0"/>
-              <a:t> = </a:t>
-            </a:r>
-            <a:r>
-              <a:rPr lang="it-IT" sz="1200" dirty="0" smtClean="0"/>
-              <a:t>110</a:t>
-            </a:r>
-          </a:p>
-          <a:p>
-            <a:pPr marL="0" indent="0">
-              <a:buNone/>
-            </a:pPr>
-            <a:endParaRPr lang="it-IT" sz="1200" dirty="0"/>
-          </a:p>
-          <a:p>
-            <a:pPr marL="0" indent="0">
-              <a:buNone/>
-            </a:pPr>
-            <a:r>
-              <a:rPr lang="pl-PL" sz="1200" dirty="0"/>
-              <a:t>jw80600009001_02101_00001.mirimage</a:t>
-            </a:r>
-          </a:p>
-          <a:p>
-            <a:pPr marL="0" indent="0">
-              <a:buNone/>
-            </a:pPr>
-            <a:r>
-              <a:rPr lang="pl-PL" sz="1200" dirty="0" smtClean="0"/>
-              <a:t>…</a:t>
-            </a:r>
-            <a:endParaRPr lang="pl-PL" sz="1200" dirty="0"/>
-          </a:p>
-          <a:p>
-            <a:pPr marL="0" indent="0">
-              <a:buNone/>
-            </a:pPr>
-            <a:r>
-              <a:rPr lang="pl-PL" sz="1200" dirty="0"/>
-              <a:t>jw99001001001_02101_00004.mirimage</a:t>
-            </a:r>
-          </a:p>
-          <a:p>
-            <a:pPr marL="0" indent="0">
-              <a:buNone/>
-            </a:pPr>
-            <a:r>
-              <a:rPr lang="pl-PL" sz="1200" dirty="0" smtClean="0"/>
-              <a:t>jw99002002001_02101_00001</a:t>
-            </a:r>
-            <a:r>
-              <a:rPr lang="pl-PL" sz="1200" dirty="0"/>
-              <a:t>.</a:t>
-            </a:r>
-            <a:r>
-              <a:rPr lang="pl-PL" sz="1200" dirty="0" smtClean="0"/>
-              <a:t>mirimage</a:t>
-            </a:r>
-            <a:endParaRPr lang="pl-PL" sz="1200" dirty="0"/>
-          </a:p>
-        </p:txBody>
-      </p:sp>
-    </p:spTree>
-    <p:extLst>
-      <p:ext uri="{BB962C8B-B14F-4D97-AF65-F5344CB8AC3E}">
-        <p14:creationId xmlns:p14="http://schemas.microsoft.com/office/powerpoint/2010/main" val="1768247502"/>
-      </p:ext>
-    </p:extLst>
-  </p:cSld>
-  <p:clrMapOvr>
-    <a:masterClrMapping/>
-  </p:clrMapOvr>
-</p:sld>
-</file>
-
 <file path=ppt/slides/slide7.xml><?xml version="1.0" encoding="utf-8"?>
 <p:sld xmlns:a="http://schemas.openxmlformats.org/drawingml/2006/main" xmlns:r="http://schemas.openxmlformats.org/officeDocument/2006/relationships" xmlns:p="http://schemas.openxmlformats.org/presentationml/2006/main">
   <p:cSld>
@@ -4821,8 +5019,8 @@
         </p:nvSpPr>
         <p:spPr>
           <a:xfrm>
-            <a:off x="457200" y="274638"/>
-            <a:ext cx="8229600" cy="629274"/>
+            <a:off x="457200" y="137335"/>
+            <a:ext cx="8229600" cy="480529"/>
           </a:xfrm>
         </p:spPr>
         <p:txBody>
@@ -4837,15 +5035,7 @@
             </a:r>
             <a:r>
               <a:rPr lang="en-US" dirty="0" smtClean="0"/>
-              <a:t> output (</a:t>
-            </a:r>
-            <a:r>
-              <a:rPr lang="en-US" dirty="0" err="1" smtClean="0"/>
-              <a:t>cont</a:t>
-            </a:r>
-            <a:r>
-              <a:rPr lang="en-US" dirty="0" smtClean="0"/>
-              <a:t>)</a:t>
+              <a:t> output</a:t>
             </a:r>
             <a:endParaRPr lang="en-US" dirty="0"/>
           </a:p>
@@ -4861,181 +5051,337 @@
             <p:ph idx="1"/>
           </p:nvPr>
         </p:nvSpPr>
-        <p:spPr/>
+        <p:spPr>
+          <a:xfrm>
+            <a:off x="549154" y="972563"/>
+            <a:ext cx="8137645" cy="5492121"/>
+          </a:xfrm>
+        </p:spPr>
         <p:txBody>
           <a:bodyPr>
-            <a:normAutofit fontScale="47500" lnSpcReduction="20000"/>
+            <a:noAutofit/>
           </a:bodyPr>
           <a:lstStyle/>
           <a:p>
-            <a:r>
-              <a:rPr lang="fr-FR" dirty="0" smtClean="0"/>
-              <a:t>CRDS  : INFO     ==================== unique </a:t>
-            </a:r>
-            <a:r>
-              <a:rPr lang="fr-FR" dirty="0" err="1" smtClean="0"/>
-              <a:t>error</a:t>
-            </a:r>
-            <a:r>
-              <a:rPr lang="fr-FR" dirty="0" smtClean="0"/>
-              <a:t> classes ====================</a:t>
-            </a:r>
-          </a:p>
-          <a:p>
-            <a:r>
-              <a:rPr lang="en-US" dirty="0" smtClean="0"/>
-              <a:t>CRDS  : INFO     8 total errors like:: instrument='MIRI' type='FLAT' data='JW80600009001_02101_00001.MIRIMAGE:JW80600009001_02101_00001.MIRIMAGE' ::  New: No match found =&gt; 'N/A'.</a:t>
-            </a:r>
-          </a:p>
-          <a:p>
-            <a:r>
-              <a:rPr lang="en-US" dirty="0" smtClean="0"/>
-              <a:t>CRDS  : INFO     26 total errors like:: instrument='MIRI' type='FLAT' data='JW80600009001_02101_00001.MIRIMAGE:JW80600009001_02101_00001.MIRIMAGE' ::  Old: No match found =&gt; 'N/A'.</a:t>
-            </a:r>
-          </a:p>
-          <a:p>
-            <a:r>
-              <a:rPr lang="en-US" dirty="0" smtClean="0"/>
-              <a:t>CRDS  : INFO     Unique error types: 2</a:t>
-            </a:r>
-          </a:p>
-          <a:p>
-            <a:r>
-              <a:rPr lang="pt-BR" dirty="0" smtClean="0"/>
-              <a:t>CRDS  : INFO     ==================== ==================== ====================</a:t>
-            </a:r>
-          </a:p>
-          <a:p>
-            <a:r>
-              <a:rPr lang="pt-BR" dirty="0" smtClean="0"/>
-              <a:t>CRDS  : INFO     STARTED 2016-05-23 15:10:31.07</a:t>
-            </a:r>
-          </a:p>
-          <a:p>
-            <a:r>
-              <a:rPr lang="pt-BR" dirty="0" smtClean="0"/>
-              <a:t>CRDS  : INFO     STOPPED 2016-05-23 15:11:39.53</a:t>
-            </a:r>
-          </a:p>
-          <a:p>
-            <a:r>
-              <a:rPr lang="pt-BR" dirty="0" smtClean="0"/>
-              <a:t>CRDS  : INFO     ELAPSED 0:01:08.46</a:t>
-            </a:r>
-          </a:p>
-          <a:p>
-            <a:r>
-              <a:rPr lang="pt-BR" dirty="0" smtClean="0"/>
-              <a:t>CRDS  : INFO           0 total-bytes </a:t>
-            </a:r>
-            <a:r>
-              <a:rPr lang="pt-BR" dirty="0" err="1" smtClean="0"/>
-              <a:t>at</a:t>
-            </a:r>
-            <a:r>
-              <a:rPr lang="pt-BR" dirty="0" smtClean="0"/>
-              <a:t>    0.0  total-bytes-per-</a:t>
-            </a:r>
-            <a:r>
-              <a:rPr lang="pt-BR" dirty="0" err="1" smtClean="0"/>
-              <a:t>second</a:t>
-            </a:r>
-            <a:endParaRPr lang="pt-BR" dirty="0" smtClean="0"/>
-          </a:p>
-          <a:p>
-            <a:r>
-              <a:rPr lang="pt-BR" dirty="0" smtClean="0"/>
-              <a:t>CRDS  : INFO           0 total-files </a:t>
-            </a:r>
-            <a:r>
-              <a:rPr lang="pt-BR" dirty="0" err="1" smtClean="0"/>
-              <a:t>at</a:t>
-            </a:r>
-            <a:r>
-              <a:rPr lang="pt-BR" dirty="0" smtClean="0"/>
-              <a:t>    0.0  total-files-per-</a:t>
-            </a:r>
-            <a:r>
-              <a:rPr lang="pt-BR" dirty="0" err="1" smtClean="0"/>
-              <a:t>second</a:t>
-            </a:r>
-            <a:endParaRPr lang="pt-BR" dirty="0" smtClean="0"/>
-          </a:p>
-          <a:p>
-            <a:r>
-              <a:rPr lang="pt-BR" dirty="0" smtClean="0"/>
-              <a:t>CRDS  : INFO         335 </a:t>
-            </a:r>
-            <a:r>
-              <a:rPr lang="pt-BR" dirty="0" err="1" smtClean="0"/>
-              <a:t>datasets</a:t>
-            </a:r>
-            <a:r>
-              <a:rPr lang="pt-BR" dirty="0" smtClean="0"/>
+            <a:pPr marL="0" indent="0">
+              <a:buNone/>
+            </a:pPr>
+            <a:r>
+              <a:rPr lang="en-US" sz="1200" dirty="0"/>
+              <a:t>CRDS  : INFO     Mapping differences from 'jwst_0183.pmap' --&gt; 'jwst_0190.pmap' affect:</a:t>
+            </a:r>
+          </a:p>
+          <a:p>
+            <a:pPr marL="0" indent="0">
+              <a:buNone/>
+            </a:pPr>
+            <a:r>
+              <a:rPr lang="en-US" sz="1200" dirty="0"/>
+              <a:t> {'</a:t>
+            </a:r>
+            <a:r>
+              <a:rPr lang="en-US" sz="1200" dirty="0" err="1"/>
+              <a:t>miri</a:t>
+            </a:r>
+            <a:r>
+              <a:rPr lang="en-US" sz="1200" dirty="0"/>
+              <a:t>': ['</a:t>
+            </a:r>
+            <a:r>
+              <a:rPr lang="en-US" sz="1200" dirty="0" err="1"/>
+              <a:t>readnoise</a:t>
+            </a:r>
+            <a:r>
+              <a:rPr lang="en-US" sz="1200" dirty="0"/>
+              <a:t>', 'dark', 'flat', '</a:t>
+            </a:r>
+            <a:r>
+              <a:rPr lang="en-US" sz="1200" dirty="0" err="1"/>
+              <a:t>lastframe</a:t>
+            </a:r>
+            <a:r>
+              <a:rPr lang="en-US" sz="1200" dirty="0"/>
+              <a:t>', 'area', 'reset', '</a:t>
+            </a:r>
+            <a:r>
+              <a:rPr lang="en-US" sz="1200" dirty="0" err="1"/>
+              <a:t>photom</a:t>
+            </a:r>
+            <a:r>
+              <a:rPr lang="en-US" sz="1200" dirty="0"/>
+              <a:t>']</a:t>
+            </a:r>
+            <a:r>
+              <a:rPr lang="en-US" sz="1200" dirty="0" smtClean="0"/>
+              <a:t>}</a:t>
+            </a:r>
+          </a:p>
+          <a:p>
+            <a:pPr marL="0" indent="0">
+              <a:buNone/>
+            </a:pPr>
+            <a:endParaRPr lang="en-US" sz="1200" dirty="0"/>
+          </a:p>
+          <a:p>
+            <a:pPr marL="0" indent="0">
+              <a:buNone/>
+            </a:pPr>
+            <a:r>
+              <a:rPr lang="en-US" sz="1200" dirty="0"/>
+              <a:t>CRDS  : INFO     Checking all dates due to header changes or file deletions.</a:t>
+            </a:r>
+          </a:p>
+          <a:p>
+            <a:pPr marL="0" indent="0">
+              <a:buNone/>
+            </a:pPr>
+            <a:r>
+              <a:rPr lang="en-US" sz="1200" dirty="0"/>
+              <a:t>CRDS  : INFO     Computing </a:t>
+            </a:r>
+            <a:r>
+              <a:rPr lang="en-US" sz="1200" dirty="0" err="1"/>
+              <a:t>bestrefs</a:t>
+            </a:r>
+            <a:r>
+              <a:rPr lang="en-US" sz="1200" dirty="0"/>
+              <a:t> for </a:t>
+            </a:r>
+            <a:r>
+              <a:rPr lang="en-US" sz="1200" dirty="0" err="1"/>
+              <a:t>db</a:t>
+            </a:r>
+            <a:r>
+              <a:rPr lang="en-US" sz="1200" dirty="0"/>
+              <a:t> datasets for </a:t>
+            </a:r>
+            <a:r>
+              <a:rPr lang="en-US" sz="1200" dirty="0" err="1"/>
+              <a:t>dict_keys</a:t>
+            </a:r>
+            <a:r>
+              <a:rPr lang="en-US" sz="1200" dirty="0"/>
+              <a:t>(['</a:t>
+            </a:r>
+            <a:r>
+              <a:rPr lang="en-US" sz="1200" dirty="0" err="1"/>
+              <a:t>miri</a:t>
+            </a:r>
+            <a:r>
+              <a:rPr lang="en-US" sz="1200" dirty="0"/>
+              <a:t>'])</a:t>
+            </a:r>
+          </a:p>
+          <a:p>
+            <a:pPr marL="0" indent="0">
+              <a:buNone/>
+            </a:pPr>
+            <a:r>
+              <a:rPr lang="en-US" sz="1200" dirty="0"/>
+              <a:t>CRDS  : INFO     Dumping dataset parameters for '</a:t>
+            </a:r>
+            <a:r>
+              <a:rPr lang="en-US" sz="1200" dirty="0" err="1"/>
+              <a:t>miri</a:t>
+            </a:r>
+            <a:r>
+              <a:rPr lang="en-US" sz="1200" dirty="0"/>
+              <a:t>' from CRDS server at 'https://jwst-crds-b6it.stsci.edu' since '1900-01-01 00:00:00'</a:t>
+            </a:r>
+          </a:p>
+          <a:p>
+            <a:pPr marL="0" indent="0">
+              <a:buNone/>
+            </a:pPr>
+            <a:r>
+              <a:rPr lang="en-US" sz="1200" dirty="0"/>
+              <a:t>CRDS  : INFO     Downloaded  335 dataset ids for '</a:t>
+            </a:r>
+            <a:r>
+              <a:rPr lang="en-US" sz="1200" dirty="0" err="1"/>
+              <a:t>miri</a:t>
+            </a:r>
+            <a:r>
+              <a:rPr lang="en-US" sz="1200" dirty="0"/>
+              <a:t>' since '1900-01-01 00:00:</a:t>
+            </a:r>
+            <a:r>
+              <a:rPr lang="en-US" sz="1200" dirty="0" smtClean="0"/>
+              <a:t>00’</a:t>
+            </a:r>
+          </a:p>
+          <a:p>
+            <a:pPr marL="0" indent="0">
+              <a:buNone/>
+            </a:pPr>
+            <a:endParaRPr lang="en-US" sz="1200" dirty="0"/>
+          </a:p>
+          <a:p>
+            <a:pPr marL="0" indent="0">
+              <a:buNone/>
+            </a:pPr>
+            <a:r>
+              <a:rPr lang="en-US" sz="1200" dirty="0" smtClean="0"/>
+              <a:t>CRDS  </a:t>
+            </a:r>
+            <a:r>
+              <a:rPr lang="en-US" sz="1200" dirty="0"/>
+              <a:t>: ERROR    instrument='MIRI' type='FLAT' data='JW80600039001_02102_00001.MIRIFULONG:JW80600039001_02102_00001.MIRIFULONG' ::  New: No match found =&gt; 'N/A'.</a:t>
+            </a:r>
+          </a:p>
+          <a:p>
+            <a:pPr marL="0" indent="0">
+              <a:buNone/>
+            </a:pPr>
+            <a:r>
+              <a:rPr lang="en-US" sz="1200" dirty="0" smtClean="0"/>
+              <a:t>…</a:t>
+            </a:r>
+          </a:p>
+          <a:p>
+            <a:pPr marL="0" indent="0">
+              <a:buNone/>
+            </a:pPr>
+            <a:r>
+              <a:rPr lang="en-US" sz="1200" dirty="0" smtClean="0"/>
+              <a:t>CRDS  </a:t>
+            </a:r>
+            <a:r>
+              <a:rPr lang="en-US" sz="1200" dirty="0"/>
+              <a:t>: ERROR    instrument='MIRI' type='FLAT' data='JW99001001001_02102_00001.MIRIMAGE:JW99001001001_02102_00001.MIRIMAGE' ::  Old: No match found =&gt; 'N/A'.</a:t>
+            </a:r>
+          </a:p>
+          <a:p>
+            <a:pPr marL="0" indent="0">
+              <a:buNone/>
+            </a:pPr>
+            <a:endParaRPr lang="en-US" sz="1200" dirty="0" smtClean="0"/>
+          </a:p>
+          <a:p>
+            <a:pPr marL="0" indent="0">
+              <a:buNone/>
+            </a:pPr>
+            <a:r>
+              <a:rPr lang="en-US" sz="1200" dirty="0" smtClean="0"/>
+              <a:t>CRDS  </a:t>
+            </a:r>
+            <a:r>
+              <a:rPr lang="en-US" sz="1200" dirty="0"/>
+              <a:t>: INFO     Updated exposure counts:</a:t>
+            </a:r>
+          </a:p>
+          <a:p>
+            <a:pPr marL="0" indent="0">
+              <a:buNone/>
+            </a:pPr>
+            <a:r>
+              <a:rPr lang="it-IT" sz="1200" dirty="0"/>
+              <a:t> {'MIRI': {'area': 77, '</a:t>
+            </a:r>
+            <a:r>
+              <a:rPr lang="it-IT" sz="1200" dirty="0" err="1"/>
+              <a:t>flat</a:t>
+            </a:r>
+            <a:r>
+              <a:rPr lang="it-IT" sz="1200" dirty="0"/>
+              <a:t>': 90, '</a:t>
+            </a:r>
+            <a:r>
+              <a:rPr lang="it-IT" sz="1200" dirty="0" err="1"/>
+              <a:t>photom</a:t>
+            </a:r>
+            <a:r>
+              <a:rPr lang="it-IT" sz="1200" dirty="0"/>
+              <a:t>': 110}}</a:t>
+            </a:r>
+          </a:p>
+          <a:p>
+            <a:pPr marL="0" indent="0">
+              <a:buNone/>
+            </a:pPr>
+            <a:r>
+              <a:rPr lang="it-IT" sz="1200" dirty="0"/>
+              <a:t>CRDS  : INFO     </a:t>
+            </a:r>
+            <a:r>
+              <a:rPr lang="it-IT" sz="1200" dirty="0" err="1"/>
+              <a:t>Affected</a:t>
+            </a:r>
+            <a:r>
+              <a:rPr lang="it-IT" sz="1200" dirty="0"/>
               <a:t> </a:t>
             </a:r>
             <a:r>
-              <a:rPr lang="pt-BR" dirty="0" err="1" smtClean="0"/>
-              <a:t>at</a:t>
-            </a:r>
-            <a:r>
-              <a:rPr lang="pt-BR" dirty="0" smtClean="0"/>
-              <a:t>    4.9  </a:t>
-            </a:r>
-            <a:r>
-              <a:rPr lang="pt-BR" dirty="0" err="1" smtClean="0"/>
-              <a:t>datasets</a:t>
-            </a:r>
-            <a:r>
-              <a:rPr lang="pt-BR" dirty="0" smtClean="0"/>
-              <a:t>-per-</a:t>
-            </a:r>
-            <a:r>
-              <a:rPr lang="pt-BR" dirty="0" err="1" smtClean="0"/>
-              <a:t>second</a:t>
-            </a:r>
-            <a:endParaRPr lang="pt-BR" dirty="0" smtClean="0"/>
-          </a:p>
-          <a:p>
-            <a:r>
-              <a:rPr lang="pt-BR" dirty="0" smtClean="0"/>
-              <a:t>CRDS  : INFO     34 </a:t>
-            </a:r>
-            <a:r>
-              <a:rPr lang="pt-BR" dirty="0" err="1" smtClean="0"/>
-              <a:t>errors</a:t>
-            </a:r>
-            <a:endParaRPr lang="pt-BR" dirty="0" smtClean="0"/>
-          </a:p>
-          <a:p>
-            <a:r>
-              <a:rPr lang="pt-BR" dirty="0" smtClean="0"/>
-              <a:t>CRDS  : INFO     0 </a:t>
-            </a:r>
-            <a:r>
-              <a:rPr lang="pt-BR" dirty="0" err="1" smtClean="0"/>
-              <a:t>warnings</a:t>
-            </a:r>
-            <a:endParaRPr lang="pt-BR" dirty="0" smtClean="0"/>
-          </a:p>
-          <a:p>
-            <a:r>
-              <a:rPr lang="ro-RO" dirty="0" smtClean="0"/>
-              <a:t>CRDS  : INFO     18 infos</a:t>
+              <a:rPr lang="it-IT" sz="1200" dirty="0" err="1"/>
+              <a:t>products</a:t>
+            </a:r>
+            <a:r>
+              <a:rPr lang="it-IT" sz="1200" dirty="0"/>
+              <a:t> = </a:t>
+            </a:r>
+            <a:r>
+              <a:rPr lang="it-IT" sz="1200" dirty="0" smtClean="0"/>
+              <a:t>110</a:t>
             </a:r>
           </a:p>
           <a:p>
             <a:pPr marL="0" indent="0">
               <a:buNone/>
             </a:pPr>
-            <a:endParaRPr lang="en-US" dirty="0"/>
+            <a:endParaRPr lang="it-IT" sz="1200" dirty="0"/>
+          </a:p>
+          <a:p>
+            <a:pPr marL="0" indent="0">
+              <a:buNone/>
+            </a:pPr>
+            <a:r>
+              <a:rPr lang="pl-PL" sz="1200" dirty="0"/>
+              <a:t>jw80600009001_02101_00001.mirimage</a:t>
+            </a:r>
+          </a:p>
+          <a:p>
+            <a:pPr marL="0" indent="0">
+              <a:buNone/>
+            </a:pPr>
+            <a:r>
+              <a:rPr lang="pl-PL" sz="1200" dirty="0" smtClean="0"/>
+              <a:t>…</a:t>
+            </a:r>
+            <a:endParaRPr lang="pl-PL" sz="1200" dirty="0"/>
+          </a:p>
+          <a:p>
+            <a:pPr marL="0" indent="0">
+              <a:buNone/>
+            </a:pPr>
+            <a:r>
+              <a:rPr lang="pl-PL" sz="1200" dirty="0"/>
+              <a:t>jw99001001001_02101_00004.mirimage</a:t>
+            </a:r>
+          </a:p>
+          <a:p>
+            <a:pPr marL="0" indent="0">
+              <a:buNone/>
+            </a:pPr>
+            <a:r>
+              <a:rPr lang="pl-PL" sz="1200" dirty="0" smtClean="0"/>
+              <a:t>jw99002002001_02101_00001</a:t>
+            </a:r>
+            <a:r>
+              <a:rPr lang="pl-PL" sz="1200" dirty="0"/>
+              <a:t>.</a:t>
+            </a:r>
+            <a:r>
+              <a:rPr lang="pl-PL" sz="1200" dirty="0" smtClean="0"/>
+              <a:t>mirimage</a:t>
+            </a:r>
+            <a:endParaRPr lang="pl-PL" sz="1200" dirty="0"/>
           </a:p>
         </p:txBody>
       </p:sp>
     </p:spTree>
     <p:extLst>
       <p:ext uri="{BB962C8B-B14F-4D97-AF65-F5344CB8AC3E}">
-        <p14:creationId xmlns:p14="http://schemas.microsoft.com/office/powerpoint/2010/main" val="3469968334"/>
+        <p14:creationId xmlns:p14="http://schemas.microsoft.com/office/powerpoint/2010/main" val="1768247502"/>
       </p:ext>
     </p:extLst>
   </p:cSld>
@@ -5072,94 +5418,218 @@
             <p:ph type="title"/>
           </p:nvPr>
         </p:nvSpPr>
-        <p:spPr/>
-        <p:txBody>
-          <a:bodyPr>
-            <a:normAutofit/>
-          </a:bodyPr>
-          <a:lstStyle/>
-          <a:p>
-            <a:r>
-              <a:rPr lang="en-US" dirty="0" smtClean="0"/>
-              <a:t>Affected Datasets System</a:t>
-            </a:r>
-            <a:endParaRPr lang="en-US" dirty="0"/>
-          </a:p>
-        </p:txBody>
-      </p:sp>
-      <p:sp>
-        <p:nvSpPr>
-          <p:cNvPr id="3" name="Content Placeholder 2"/>
-          <p:cNvSpPr>
-            <a:spLocks noGrp="1"/>
-          </p:cNvSpPr>
-          <p:nvPr>
-            <p:ph idx="1"/>
-          </p:nvPr>
-        </p:nvSpPr>
         <p:spPr>
           <a:xfrm>
-            <a:off x="551271" y="1951870"/>
-            <a:ext cx="8229600" cy="4174293"/>
+            <a:off x="457200" y="274638"/>
+            <a:ext cx="8229600" cy="629274"/>
           </a:xfrm>
         </p:spPr>
         <p:txBody>
           <a:bodyPr>
-            <a:normAutofit/>
+            <a:normAutofit fontScale="90000"/>
           </a:bodyPr>
           <a:lstStyle/>
           <a:p>
-            <a:pPr marL="0" indent="0">
-              <a:buNone/>
-            </a:pPr>
-            <a:endParaRPr lang="en-US" dirty="0" smtClean="0"/>
-          </a:p>
-          <a:p>
-            <a:pPr lvl="1"/>
-            <a:r>
-              <a:rPr lang="en-US" dirty="0" smtClean="0"/>
-              <a:t>Automatically runs </a:t>
-            </a:r>
             <a:r>
               <a:rPr lang="en-US" dirty="0" err="1" smtClean="0"/>
               <a:t>crds.bestrefs</a:t>
             </a:r>
             <a:r>
               <a:rPr lang="en-US" dirty="0" smtClean="0"/>
-              <a:t> basic tool</a:t>
-            </a:r>
-          </a:p>
-          <a:p>
-            <a:pPr lvl="1"/>
-            <a:r>
-              <a:rPr lang="en-US" dirty="0" smtClean="0"/>
-              <a:t>Permanently Stores Results</a:t>
-            </a:r>
-          </a:p>
-          <a:p>
-            <a:pPr lvl="1"/>
-            <a:r>
-              <a:rPr lang="en-US" dirty="0" smtClean="0"/>
-              <a:t>Client/Server interface for fetching results</a:t>
-            </a:r>
-          </a:p>
-          <a:p>
-            <a:pPr lvl="1"/>
-            <a:r>
-              <a:rPr lang="en-US" dirty="0" smtClean="0"/>
-              <a:t>E-mails </a:t>
-            </a:r>
-            <a:r>
-              <a:rPr lang="en-US" dirty="0" smtClean="0"/>
-              <a:t>results</a:t>
-            </a:r>
-            <a:endParaRPr lang="en-US" dirty="0" smtClean="0"/>
-          </a:p>
-          <a:p>
-            <a:pPr lvl="1"/>
-            <a:endParaRPr lang="en-US" dirty="0" smtClean="0"/>
-          </a:p>
-          <a:p>
+              <a:t> output (</a:t>
+            </a:r>
+            <a:r>
+              <a:rPr lang="en-US" dirty="0" err="1" smtClean="0"/>
+              <a:t>cont</a:t>
+            </a:r>
+            <a:r>
+              <a:rPr lang="en-US" dirty="0" smtClean="0"/>
+              <a:t>)</a:t>
+            </a:r>
+            <a:endParaRPr lang="en-US" dirty="0"/>
+          </a:p>
+        </p:txBody>
+      </p:sp>
+      <p:sp>
+        <p:nvSpPr>
+          <p:cNvPr id="3" name="Content Placeholder 2"/>
+          <p:cNvSpPr>
+            <a:spLocks noGrp="1"/>
+          </p:cNvSpPr>
+          <p:nvPr>
+            <p:ph idx="1"/>
+          </p:nvPr>
+        </p:nvSpPr>
+        <p:spPr/>
+        <p:txBody>
+          <a:bodyPr>
+            <a:normAutofit fontScale="47500" lnSpcReduction="20000"/>
+          </a:bodyPr>
+          <a:lstStyle/>
+          <a:p>
+            <a:r>
+              <a:rPr lang="fr-FR" dirty="0" smtClean="0"/>
+              <a:t>CRDS  : INFO     ==================== unique </a:t>
+            </a:r>
+            <a:r>
+              <a:rPr lang="fr-FR" dirty="0" err="1" smtClean="0"/>
+              <a:t>error</a:t>
+            </a:r>
+            <a:r>
+              <a:rPr lang="fr-FR" dirty="0" smtClean="0"/>
+              <a:t> classes ====================</a:t>
+            </a:r>
+          </a:p>
+          <a:p>
+            <a:r>
+              <a:rPr lang="en-US" dirty="0" smtClean="0"/>
+              <a:t>CRDS  : INFO     8 total errors like:: instrument='MIRI' type='FLAT' data='JW80600009001_02101_00001.MIRIMAGE:JW80600009001_02101_00001.MIRIMAGE' ::  New: No match found =&gt; 'N/A'.</a:t>
+            </a:r>
+          </a:p>
+          <a:p>
+            <a:r>
+              <a:rPr lang="en-US" dirty="0" smtClean="0"/>
+              <a:t>CRDS  : INFO     26 total errors like:: instrument='MIRI' type='FLAT' data='JW80600009001_02101_00001.MIRIMAGE:JW80600009001_02101_00001.MIRIMAGE' ::  Old: No match found =&gt; 'N/A'.</a:t>
+            </a:r>
+          </a:p>
+          <a:p>
+            <a:r>
+              <a:rPr lang="en-US" dirty="0" smtClean="0"/>
+              <a:t>CRDS  : INFO     Unique error types: 2</a:t>
+            </a:r>
+          </a:p>
+          <a:p>
+            <a:r>
+              <a:rPr lang="pt-BR" dirty="0" smtClean="0"/>
+              <a:t>CRDS  : INFO     ==================== ==================== ====================</a:t>
+            </a:r>
+          </a:p>
+          <a:p>
+            <a:endParaRPr lang="pt-BR" dirty="0" smtClean="0"/>
+          </a:p>
+          <a:p>
+            <a:r>
+              <a:rPr lang="pt-BR" dirty="0" smtClean="0"/>
+              <a:t>CRDS  : INFO     STARTED 2016-05-23 15:10:31.07</a:t>
+            </a:r>
+          </a:p>
+          <a:p>
+            <a:r>
+              <a:rPr lang="pt-BR" dirty="0" smtClean="0"/>
+              <a:t>CRDS  : INFO     STOPPED 2016-05-23 15:11:39.53</a:t>
+            </a:r>
+          </a:p>
+          <a:p>
+            <a:r>
+              <a:rPr lang="pt-BR" dirty="0" smtClean="0"/>
+              <a:t>CRDS  : INFO     ELAPSED 0:01:08.46</a:t>
+            </a:r>
+          </a:p>
+          <a:p>
+            <a:r>
+              <a:rPr lang="pt-BR" dirty="0" smtClean="0"/>
+              <a:t>CRDS  : INFO           0 total-bytes </a:t>
+            </a:r>
+            <a:r>
+              <a:rPr lang="pt-BR" dirty="0" err="1" smtClean="0"/>
+              <a:t>at</a:t>
+            </a:r>
+            <a:r>
+              <a:rPr lang="pt-BR" dirty="0" smtClean="0"/>
+              <a:t>    0.0  total-bytes-per-</a:t>
+            </a:r>
+            <a:r>
+              <a:rPr lang="pt-BR" dirty="0" err="1" smtClean="0"/>
+              <a:t>second</a:t>
+            </a:r>
+            <a:endParaRPr lang="pt-BR" dirty="0" smtClean="0"/>
+          </a:p>
+          <a:p>
+            <a:r>
+              <a:rPr lang="pt-BR" dirty="0" smtClean="0"/>
+              <a:t>CRDS  : INFO           0 total-files </a:t>
+            </a:r>
+            <a:r>
+              <a:rPr lang="pt-BR" dirty="0" err="1" smtClean="0"/>
+              <a:t>at</a:t>
+            </a:r>
+            <a:r>
+              <a:rPr lang="pt-BR" dirty="0" smtClean="0"/>
+              <a:t>    0.0  total-files-per-</a:t>
+            </a:r>
+            <a:r>
+              <a:rPr lang="pt-BR" dirty="0" err="1" smtClean="0"/>
+              <a:t>second</a:t>
+            </a:r>
+            <a:endParaRPr lang="pt-BR" dirty="0" smtClean="0"/>
+          </a:p>
+          <a:p>
+            <a:r>
+              <a:rPr lang="pt-BR" dirty="0" smtClean="0"/>
+              <a:t>CRDS  : INFO         335 </a:t>
+            </a:r>
+            <a:r>
+              <a:rPr lang="pt-BR" dirty="0" err="1" smtClean="0"/>
+              <a:t>datasets</a:t>
+            </a:r>
+            <a:r>
+              <a:rPr lang="pt-BR" dirty="0" smtClean="0"/>
+              <a:t> </a:t>
+            </a:r>
+            <a:r>
+              <a:rPr lang="pt-BR" dirty="0" err="1" smtClean="0"/>
+              <a:t>at</a:t>
+            </a:r>
+            <a:r>
+              <a:rPr lang="pt-BR" dirty="0" smtClean="0"/>
+              <a:t>    4.9  </a:t>
+            </a:r>
+            <a:r>
+              <a:rPr lang="pt-BR" dirty="0" err="1" smtClean="0"/>
+              <a:t>datasets</a:t>
+            </a:r>
+            <a:r>
+              <a:rPr lang="pt-BR" dirty="0" smtClean="0"/>
+              <a:t>-per-</a:t>
+            </a:r>
+            <a:r>
+              <a:rPr lang="pt-BR" dirty="0" err="1" smtClean="0"/>
+              <a:t>second</a:t>
+            </a:r>
+            <a:endParaRPr lang="pt-BR" dirty="0" smtClean="0"/>
+          </a:p>
+          <a:p>
+            <a:r>
+              <a:rPr lang="pt-BR" dirty="0" smtClean="0"/>
+              <a:t>CRDS  : INFO     34 </a:t>
+            </a:r>
+            <a:r>
+              <a:rPr lang="pt-BR" dirty="0" err="1" smtClean="0"/>
+              <a:t>errors</a:t>
+            </a:r>
+            <a:endParaRPr lang="pt-BR" dirty="0" smtClean="0"/>
+          </a:p>
+          <a:p>
+            <a:r>
+              <a:rPr lang="pt-BR" dirty="0" smtClean="0"/>
+              <a:t>CRDS  : INFO     0 </a:t>
+            </a:r>
+            <a:r>
+              <a:rPr lang="pt-BR" dirty="0" err="1" smtClean="0"/>
+              <a:t>warnings</a:t>
+            </a:r>
+            <a:endParaRPr lang="pt-BR" dirty="0" smtClean="0"/>
+          </a:p>
+          <a:p>
+            <a:r>
+              <a:rPr lang="ro-RO" dirty="0" smtClean="0"/>
+              <a:t>CRDS  : INFO     18 infos</a:t>
+            </a:r>
+          </a:p>
+          <a:p>
+            <a:pPr marL="0" indent="0">
+              <a:buNone/>
+            </a:pPr>
             <a:endParaRPr lang="en-US" dirty="0"/>
           </a:p>
         </p:txBody>
@@ -5167,20 +5637,13 @@
     </p:spTree>
     <p:extLst>
       <p:ext uri="{BB962C8B-B14F-4D97-AF65-F5344CB8AC3E}">
-        <p14:creationId xmlns:p14="http://schemas.microsoft.com/office/powerpoint/2010/main" val="2363340426"/>
+        <p14:creationId xmlns:p14="http://schemas.microsoft.com/office/powerpoint/2010/main" val="3469968334"/>
       </p:ext>
     </p:extLst>
   </p:cSld>
   <p:clrMapOvr>
     <a:masterClrMapping/>
   </p:clrMapOvr>
-  <p:timing>
-    <p:tnLst>
-      <p:par>
-        <p:cTn xmlns:p14="http://schemas.microsoft.com/office/powerpoint/2010/main" id="1" dur="indefinite" restart="never" nodeType="tmRoot"/>
-      </p:par>
-    </p:tnLst>
-  </p:timing>
 </p:sld>
 </file>
 
@@ -5201,53 +5664,44 @@
           <a:chExt cx="0" cy="0"/>
         </a:xfrm>
       </p:grpSpPr>
-      <p:pic>
-        <p:nvPicPr>
-          <p:cNvPr id="5" name="Picture 4" descr="monitor_reprocessing.png"/>
-          <p:cNvPicPr>
-            <a:picLocks noChangeAspect="1"/>
-          </p:cNvPicPr>
-          <p:nvPr/>
-        </p:nvPicPr>
-        <p:blipFill>
-          <a:blip r:embed="rId2">
-            <a:extLst>
-              <a:ext uri="{28A0092B-C50C-407E-A947-70E740481C1C}">
-                <a14:useLocalDpi xmlns:a14="http://schemas.microsoft.com/office/drawing/2010/main" val="0"/>
-              </a:ext>
-            </a:extLst>
-          </a:blip>
-          <a:stretch>
-            <a:fillRect/>
-          </a:stretch>
-        </p:blipFill>
+      <p:sp>
+        <p:nvSpPr>
+          <p:cNvPr id="2" name="Title 1"/>
+          <p:cNvSpPr>
+            <a:spLocks noGrp="1"/>
+          </p:cNvSpPr>
+          <p:nvPr>
+            <p:ph type="title"/>
+          </p:nvPr>
+        </p:nvSpPr>
         <p:spPr>
           <a:xfrm>
-            <a:off x="0" y="1371600"/>
-            <a:ext cx="9144000" cy="4097891"/>
+            <a:off x="457200" y="2254090"/>
+            <a:ext cx="8229600" cy="1143000"/>
           </a:xfrm>
-          <a:prstGeom prst="rect">
-            <a:avLst/>
-          </a:prstGeom>
         </p:spPr>
-      </p:pic>
+        <p:txBody>
+          <a:bodyPr/>
+          <a:lstStyle/>
+          <a:p>
+            <a:r>
+              <a:rPr lang="en-US" dirty="0" smtClean="0"/>
+              <a:t>Client/Server System</a:t>
+            </a:r>
+            <a:endParaRPr lang="en-US" dirty="0"/>
+          </a:p>
+        </p:txBody>
+      </p:sp>
     </p:spTree>
     <p:extLst>
       <p:ext uri="{BB962C8B-B14F-4D97-AF65-F5344CB8AC3E}">
-        <p14:creationId xmlns:p14="http://schemas.microsoft.com/office/powerpoint/2010/main" val="3448052673"/>
+        <p14:creationId xmlns:p14="http://schemas.microsoft.com/office/powerpoint/2010/main" val="2948911306"/>
       </p:ext>
     </p:extLst>
   </p:cSld>
   <p:clrMapOvr>
     <a:masterClrMapping/>
   </p:clrMapOvr>
-  <p:timing>
-    <p:tnLst>
-      <p:par>
-        <p:cTn xmlns:p14="http://schemas.microsoft.com/office/powerpoint/2010/main" id="1" dur="indefinite" restart="never" nodeType="tmRoot"/>
-      </p:par>
-    </p:tnLst>
-  </p:timing>
 </p:sld>
 </file>
 

</xml_diff>

<commit_message>
Updated affected datasets demo for B6.
</commit_message>
<xml_diff>
--- a/docs/Affected_Datasets_Demo.pptx
+++ b/docs/Affected_Datasets_Demo.pptx
@@ -16,12 +16,14 @@
     <p:sldId id="272" r:id="rId10"/>
     <p:sldId id="258" r:id="rId11"/>
     <p:sldId id="262" r:id="rId12"/>
-    <p:sldId id="270" r:id="rId13"/>
-    <p:sldId id="264" r:id="rId14"/>
-    <p:sldId id="267" r:id="rId15"/>
-    <p:sldId id="268" r:id="rId16"/>
-    <p:sldId id="269" r:id="rId17"/>
-    <p:sldId id="261" r:id="rId18"/>
+    <p:sldId id="264" r:id="rId13"/>
+    <p:sldId id="274" r:id="rId14"/>
+    <p:sldId id="275" r:id="rId15"/>
+    <p:sldId id="276" r:id="rId16"/>
+    <p:sldId id="277" r:id="rId17"/>
+    <p:sldId id="267" r:id="rId18"/>
+    <p:sldId id="268" r:id="rId19"/>
+    <p:sldId id="269" r:id="rId20"/>
   </p:sldIdLst>
   <p:sldSz cx="9144000" cy="6858000" type="screen4x3"/>
   <p:notesSz cx="6858000" cy="9144000"/>
@@ -3313,13 +3315,8 @@
             <a:pPr lvl="1"/>
             <a:r>
               <a:rPr lang="en-US" dirty="0" smtClean="0"/>
-              <a:t>E-mails </a:t>
-            </a:r>
-            <a:r>
-              <a:rPr lang="en-US" dirty="0" smtClean="0"/>
-              <a:t>results</a:t>
-            </a:r>
-            <a:endParaRPr lang="en-US" dirty="0" smtClean="0"/>
+              <a:t>E-mails results</a:t>
+            </a:r>
           </a:p>
           <a:p>
             <a:pPr lvl="1"/>
@@ -3434,161 +3431,6 @@
           <a:chExt cx="0" cy="0"/>
         </a:xfrm>
       </p:grpSpPr>
-      <p:sp>
-        <p:nvSpPr>
-          <p:cNvPr id="2" name="Title 1"/>
-          <p:cNvSpPr>
-            <a:spLocks noGrp="1"/>
-          </p:cNvSpPr>
-          <p:nvPr>
-            <p:ph type="title"/>
-          </p:nvPr>
-        </p:nvSpPr>
-        <p:spPr/>
-        <p:txBody>
-          <a:bodyPr/>
-          <a:lstStyle/>
-          <a:p>
-            <a:r>
-              <a:rPr lang="en-US" dirty="0" smtClean="0"/>
-              <a:t>Affected Datasets Work Flow</a:t>
-            </a:r>
-            <a:endParaRPr lang="en-US" dirty="0"/>
-          </a:p>
-        </p:txBody>
-      </p:sp>
-      <p:sp>
-        <p:nvSpPr>
-          <p:cNvPr id="3" name="Content Placeholder 2"/>
-          <p:cNvSpPr>
-            <a:spLocks noGrp="1"/>
-          </p:cNvSpPr>
-          <p:nvPr>
-            <p:ph idx="1"/>
-          </p:nvPr>
-        </p:nvSpPr>
-        <p:spPr/>
-        <p:txBody>
-          <a:bodyPr>
-            <a:normAutofit fontScale="70000" lnSpcReduction="20000"/>
-          </a:bodyPr>
-          <a:lstStyle/>
-          <a:p>
-            <a:r>
-              <a:rPr lang="en-US" dirty="0" smtClean="0"/>
-              <a:t>New References are Submitted</a:t>
-            </a:r>
-          </a:p>
-          <a:p>
-            <a:r>
-              <a:rPr lang="en-US" dirty="0" smtClean="0"/>
-              <a:t>CRDS Pipeline runs to archive files</a:t>
-            </a:r>
-          </a:p>
-          <a:p>
-            <a:r>
-              <a:rPr lang="en-US" dirty="0" smtClean="0"/>
-              <a:t>Operator does Set Context on CRDS website</a:t>
-            </a:r>
-          </a:p>
-          <a:p>
-            <a:r>
-              <a:rPr lang="en-US" dirty="0" smtClean="0"/>
-              <a:t>Operator syncs pipeline cache with new references + default</a:t>
-            </a:r>
-          </a:p>
-          <a:p>
-            <a:r>
-              <a:rPr lang="en-US" dirty="0" smtClean="0"/>
-              <a:t>CRDS server runs CRDS </a:t>
-            </a:r>
-            <a:r>
-              <a:rPr lang="en-US" dirty="0" err="1" smtClean="0"/>
-              <a:t>bestrefs</a:t>
-            </a:r>
-            <a:r>
-              <a:rPr lang="en-US" dirty="0" smtClean="0"/>
-              <a:t> </a:t>
-            </a:r>
-          </a:p>
-          <a:p>
-            <a:pPr lvl="1"/>
-            <a:r>
-              <a:rPr lang="en-US" dirty="0" smtClean="0"/>
-              <a:t>outputs permanently stored on server</a:t>
-            </a:r>
-          </a:p>
-          <a:p>
-            <a:pPr lvl="1"/>
-            <a:r>
-              <a:rPr lang="en-US" dirty="0" smtClean="0"/>
-              <a:t>e-mail issued</a:t>
-            </a:r>
-          </a:p>
-          <a:p>
-            <a:r>
-              <a:rPr lang="en-US" dirty="0" smtClean="0"/>
-              <a:t>Pipeline side query script polls server</a:t>
-            </a:r>
-          </a:p>
-          <a:p>
-            <a:pPr lvl="1"/>
-            <a:r>
-              <a:rPr lang="en-US" dirty="0" smtClean="0"/>
-              <a:t>new context transitions</a:t>
-            </a:r>
-          </a:p>
-          <a:p>
-            <a:pPr lvl="1"/>
-            <a:r>
-              <a:rPr lang="en-US" dirty="0" smtClean="0"/>
-              <a:t>affected dataset ids</a:t>
-            </a:r>
-          </a:p>
-          <a:p>
-            <a:r>
-              <a:rPr lang="en-US" dirty="0" smtClean="0"/>
-              <a:t>Reprocessing operator approves ID list</a:t>
-            </a:r>
-          </a:p>
-          <a:p>
-            <a:r>
-              <a:rPr lang="en-US" dirty="0" smtClean="0"/>
-              <a:t>Affected datasets are reprocessed by SDP</a:t>
-            </a:r>
-          </a:p>
-        </p:txBody>
-      </p:sp>
-    </p:spTree>
-    <p:extLst>
-      <p:ext uri="{BB962C8B-B14F-4D97-AF65-F5344CB8AC3E}">
-        <p14:creationId xmlns:p14="http://schemas.microsoft.com/office/powerpoint/2010/main" val="1719019723"/>
-      </p:ext>
-    </p:extLst>
-  </p:cSld>
-  <p:clrMapOvr>
-    <a:masterClrMapping/>
-  </p:clrMapOvr>
-</p:sld>
-</file>
-
-<file path=ppt/slides/slide13.xml><?xml version="1.0" encoding="utf-8"?>
-<p:sld xmlns:a="http://schemas.openxmlformats.org/drawingml/2006/main" xmlns:r="http://schemas.openxmlformats.org/officeDocument/2006/relationships" xmlns:p="http://schemas.openxmlformats.org/presentationml/2006/main">
-  <p:cSld>
-    <p:spTree>
-      <p:nvGrpSpPr>
-        <p:cNvPr id="1" name=""/>
-        <p:cNvGrpSpPr/>
-        <p:nvPr/>
-      </p:nvGrpSpPr>
-      <p:grpSpPr>
-        <a:xfrm>
-          <a:off x="0" y="0"/>
-          <a:ext cx="0" cy="0"/>
-          <a:chOff x="0" y="0"/>
-          <a:chExt cx="0" cy="0"/>
-        </a:xfrm>
-      </p:grpSpPr>
       <p:pic>
         <p:nvPicPr>
           <p:cNvPr id="4" name="Picture 3" descr="affected_datasets_workflow.png"/>
@@ -3639,6 +3481,100 @@
 </p:sld>
 </file>
 
+<file path=ppt/slides/slide13.xml><?xml version="1.0" encoding="utf-8"?>
+<p:sld xmlns:a="http://schemas.openxmlformats.org/drawingml/2006/main" xmlns:r="http://schemas.openxmlformats.org/officeDocument/2006/relationships" xmlns:p="http://schemas.openxmlformats.org/presentationml/2006/main">
+  <p:cSld>
+    <p:spTree>
+      <p:nvGrpSpPr>
+        <p:cNvPr id="1" name=""/>
+        <p:cNvGrpSpPr/>
+        <p:nvPr/>
+      </p:nvGrpSpPr>
+      <p:grpSpPr>
+        <a:xfrm>
+          <a:off x="0" y="0"/>
+          <a:ext cx="0" cy="0"/>
+          <a:chOff x="0" y="0"/>
+          <a:chExt cx="0" cy="0"/>
+        </a:xfrm>
+      </p:grpSpPr>
+      <p:sp>
+        <p:nvSpPr>
+          <p:cNvPr id="2" name="Title 1"/>
+          <p:cNvSpPr>
+            <a:spLocks noGrp="1"/>
+          </p:cNvSpPr>
+          <p:nvPr>
+            <p:ph type="title"/>
+          </p:nvPr>
+        </p:nvSpPr>
+        <p:spPr>
+          <a:xfrm>
+            <a:off x="457200" y="274638"/>
+            <a:ext cx="8229600" cy="812344"/>
+          </a:xfrm>
+        </p:spPr>
+        <p:txBody>
+          <a:bodyPr>
+            <a:normAutofit/>
+          </a:bodyPr>
+          <a:lstStyle/>
+          <a:p>
+            <a:r>
+              <a:rPr lang="en-US" dirty="0" err="1" smtClean="0"/>
+              <a:t>ReDCaT</a:t>
+            </a:r>
+            <a:r>
+              <a:rPr lang="en-US" dirty="0" smtClean="0"/>
+              <a:t> Submits References</a:t>
+            </a:r>
+            <a:endParaRPr lang="en-US" dirty="0"/>
+          </a:p>
+        </p:txBody>
+      </p:sp>
+      <p:pic>
+        <p:nvPicPr>
+          <p:cNvPr id="4" name="Picture 3" descr="BatchSubmit.png"/>
+          <p:cNvPicPr>
+            <a:picLocks noChangeAspect="1"/>
+          </p:cNvPicPr>
+          <p:nvPr/>
+        </p:nvPicPr>
+        <p:blipFill>
+          <a:blip r:embed="rId2">
+            <a:extLst>
+              <a:ext uri="{28A0092B-C50C-407E-A947-70E740481C1C}">
+                <a14:useLocalDpi xmlns:a14="http://schemas.microsoft.com/office/drawing/2010/main" val="0"/>
+              </a:ext>
+            </a:extLst>
+          </a:blip>
+          <a:stretch>
+            <a:fillRect/>
+          </a:stretch>
+        </p:blipFill>
+        <p:spPr>
+          <a:xfrm>
+            <a:off x="412295" y="1520615"/>
+            <a:ext cx="8274505" cy="4984135"/>
+          </a:xfrm>
+          <a:prstGeom prst="rect">
+            <a:avLst/>
+          </a:prstGeom>
+        </p:spPr>
+      </p:pic>
+    </p:spTree>
+    <p:extLst>
+      <p:ext uri="{BB962C8B-B14F-4D97-AF65-F5344CB8AC3E}">
+        <p14:creationId xmlns:p14="http://schemas.microsoft.com/office/powerpoint/2010/main" val="2170098702"/>
+      </p:ext>
+    </p:extLst>
+  </p:cSld>
+  <p:clrMapOvr>
+    <a:masterClrMapping/>
+  </p:clrMapOvr>
+</p:sld>
+</file>
+
 <file path=ppt/slides/slide14.xml><?xml version="1.0" encoding="utf-8"?>
 <p:sld xmlns:a="http://schemas.openxmlformats.org/drawingml/2006/main" xmlns:r="http://schemas.openxmlformats.org/officeDocument/2006/relationships" xmlns:p="http://schemas.openxmlformats.org/presentationml/2006/main">
   <p:cSld>
@@ -3669,7 +3605,7 @@
         <p:spPr>
           <a:xfrm>
             <a:off x="457200" y="274638"/>
-            <a:ext cx="8229600" cy="743693"/>
+            <a:ext cx="8229600" cy="755135"/>
           </a:xfrm>
         </p:spPr>
         <p:txBody>
@@ -3679,146 +3615,47 @@
           <a:lstStyle/>
           <a:p>
             <a:r>
-              <a:rPr lang="en-US" dirty="0" err="1" smtClean="0"/>
-              <a:t>query_affected_datasets</a:t>
+              <a:rPr lang="en-US" dirty="0" smtClean="0"/>
+              <a:t>Operator Sets Default Context</a:t>
             </a:r>
             <a:endParaRPr lang="en-US" dirty="0"/>
           </a:p>
         </p:txBody>
       </p:sp>
-      <p:sp>
-        <p:nvSpPr>
-          <p:cNvPr id="3" name="Content Placeholder 2"/>
-          <p:cNvSpPr>
-            <a:spLocks noGrp="1"/>
-          </p:cNvSpPr>
-          <p:nvPr>
-            <p:ph idx="1"/>
-          </p:nvPr>
-        </p:nvSpPr>
+      <p:pic>
+        <p:nvPicPr>
+          <p:cNvPr id="4" name="Picture 3" descr="SetContext.png"/>
+          <p:cNvPicPr>
+            <a:picLocks noChangeAspect="1"/>
+          </p:cNvPicPr>
+          <p:nvPr/>
+        </p:nvPicPr>
+        <p:blipFill>
+          <a:blip r:embed="rId2">
+            <a:extLst>
+              <a:ext uri="{28A0092B-C50C-407E-A947-70E740481C1C}">
+                <a14:useLocalDpi xmlns:a14="http://schemas.microsoft.com/office/drawing/2010/main" val="0"/>
+              </a:ext>
+            </a:extLst>
+          </a:blip>
+          <a:stretch>
+            <a:fillRect/>
+          </a:stretch>
+        </p:blipFill>
         <p:spPr>
           <a:xfrm>
-            <a:off x="457200" y="1461228"/>
-            <a:ext cx="8229600" cy="4525963"/>
+            <a:off x="823732" y="1326103"/>
+            <a:ext cx="7745372" cy="5098706"/>
           </a:xfrm>
+          <a:prstGeom prst="rect">
+            <a:avLst/>
+          </a:prstGeom>
         </p:spPr>
-        <p:txBody>
-          <a:bodyPr>
-            <a:normAutofit fontScale="85000" lnSpcReduction="20000"/>
-          </a:bodyPr>
-          <a:lstStyle/>
-          <a:p>
-            <a:r>
-              <a:rPr lang="en-US" dirty="0" smtClean="0"/>
-              <a:t>CRDS Client Script / </a:t>
-            </a:r>
-            <a:r>
-              <a:rPr lang="en-US" dirty="0" err="1" smtClean="0"/>
-              <a:t>Poller</a:t>
-            </a:r>
-            <a:endParaRPr lang="en-US" dirty="0" smtClean="0"/>
-          </a:p>
-          <a:p>
-            <a:r>
-              <a:rPr lang="en-US" dirty="0" smtClean="0"/>
-              <a:t>Run in/near pipeline’s reprocessing environment</a:t>
-            </a:r>
-          </a:p>
-          <a:p>
-            <a:r>
-              <a:rPr lang="en-US" dirty="0" smtClean="0"/>
-              <a:t>Queries CRDS Server for Stored Results</a:t>
-            </a:r>
-          </a:p>
-          <a:p>
-            <a:pPr lvl="1"/>
-            <a:r>
-              <a:rPr lang="en-US" dirty="0" smtClean="0"/>
-              <a:t>Requires connection to CRDS server</a:t>
-            </a:r>
-          </a:p>
-          <a:p>
-            <a:pPr lvl="1"/>
-            <a:r>
-              <a:rPr lang="en-US" dirty="0" smtClean="0"/>
-              <a:t>Outputs list of affected IDs to </a:t>
-            </a:r>
-            <a:r>
-              <a:rPr lang="en-US" dirty="0" err="1" smtClean="0"/>
-              <a:t>stdout</a:t>
-            </a:r>
-            <a:endParaRPr lang="en-US" dirty="0" smtClean="0"/>
-          </a:p>
-          <a:p>
-            <a:pPr lvl="1"/>
-            <a:r>
-              <a:rPr lang="en-US" dirty="0" smtClean="0"/>
-              <a:t>Outputs log to </a:t>
-            </a:r>
-            <a:r>
-              <a:rPr lang="en-US" dirty="0" err="1" smtClean="0"/>
-              <a:t>stderr</a:t>
-            </a:r>
-            <a:endParaRPr lang="en-US" dirty="0" smtClean="0"/>
-          </a:p>
-          <a:p>
-            <a:pPr lvl="1"/>
-            <a:r>
-              <a:rPr lang="en-US" dirty="0" err="1" smtClean="0"/>
-              <a:t>Stateful</a:t>
-            </a:r>
-            <a:r>
-              <a:rPr lang="en-US" dirty="0" smtClean="0"/>
-              <a:t>:  </a:t>
-            </a:r>
-          </a:p>
-          <a:p>
-            <a:pPr lvl="2"/>
-            <a:r>
-              <a:rPr lang="en-US" dirty="0" smtClean="0"/>
-              <a:t>Remembers last context processed/queried</a:t>
-            </a:r>
-          </a:p>
-          <a:p>
-            <a:pPr lvl="2"/>
-            <a:r>
-              <a:rPr lang="en-US" dirty="0" smtClean="0"/>
-              <a:t>stores state in CRDS cache </a:t>
-            </a:r>
-            <a:r>
-              <a:rPr lang="en-US" dirty="0" err="1" smtClean="0"/>
-              <a:t>config</a:t>
-            </a:r>
-            <a:r>
-              <a:rPr lang="en-US" dirty="0" smtClean="0"/>
-              <a:t> area or file</a:t>
-            </a:r>
-            <a:endParaRPr lang="en-US" dirty="0" smtClean="0"/>
-          </a:p>
-          <a:p>
-            <a:r>
-              <a:rPr lang="en-US" dirty="0" smtClean="0"/>
-              <a:t>Queries limited to context transitions in history </a:t>
-            </a:r>
-          </a:p>
-          <a:p>
-            <a:r>
-              <a:rPr lang="en-US" dirty="0" smtClean="0"/>
-              <a:t>Requires one time initialization</a:t>
-            </a:r>
-          </a:p>
-          <a:p>
-            <a:pPr marL="0" indent="0">
-              <a:buNone/>
-            </a:pPr>
-            <a:endParaRPr lang="en-US" dirty="0"/>
-          </a:p>
-        </p:txBody>
-      </p:sp>
+      </p:pic>
     </p:spTree>
     <p:extLst>
       <p:ext uri="{BB962C8B-B14F-4D97-AF65-F5344CB8AC3E}">
-        <p14:creationId xmlns:p14="http://schemas.microsoft.com/office/powerpoint/2010/main" val="2283690490"/>
+        <p14:creationId xmlns:p14="http://schemas.microsoft.com/office/powerpoint/2010/main" val="1587663957"/>
       </p:ext>
     </p:extLst>
   </p:cSld>
@@ -3855,193 +3692,88 @@
             <p:ph type="title"/>
           </p:nvPr>
         </p:nvSpPr>
-        <p:spPr/>
-        <p:txBody>
-          <a:bodyPr>
-            <a:normAutofit fontScale="90000"/>
+        <p:spPr>
+          <a:xfrm>
+            <a:off x="457200" y="274638"/>
+            <a:ext cx="8229600" cy="766577"/>
+          </a:xfrm>
+        </p:spPr>
+        <p:txBody>
+          <a:bodyPr/>
+          <a:lstStyle/>
+          <a:p>
+            <a:r>
+              <a:rPr lang="en-US" dirty="0" smtClean="0"/>
+              <a:t>Context History Updates</a:t>
+            </a:r>
+            <a:endParaRPr lang="en-US" dirty="0"/>
+          </a:p>
+        </p:txBody>
+      </p:sp>
+      <p:pic>
+        <p:nvPicPr>
+          <p:cNvPr id="4" name="Picture 3" descr="ContextHistory.png"/>
+          <p:cNvPicPr>
+            <a:picLocks noChangeAspect="1"/>
+          </p:cNvPicPr>
+          <p:nvPr/>
+        </p:nvPicPr>
+        <p:blipFill>
+          <a:blip r:embed="rId2">
+            <a:extLst>
+              <a:ext uri="{28A0092B-C50C-407E-A947-70E740481C1C}">
+                <a14:useLocalDpi xmlns:a14="http://schemas.microsoft.com/office/drawing/2010/main" val="0"/>
+              </a:ext>
+            </a:extLst>
+          </a:blip>
+          <a:stretch>
+            <a:fillRect/>
+          </a:stretch>
+        </p:blipFill>
+        <p:spPr>
+          <a:xfrm>
+            <a:off x="0" y="1816100"/>
+            <a:ext cx="9144000" cy="3216972"/>
+          </a:xfrm>
+          <a:prstGeom prst="rect">
+            <a:avLst/>
+          </a:prstGeom>
+        </p:spPr>
+      </p:pic>
+      <p:sp>
+        <p:nvSpPr>
+          <p:cNvPr id="6" name="TextBox 5"/>
+          <p:cNvSpPr txBox="1"/>
+          <p:nvPr/>
+        </p:nvSpPr>
+        <p:spPr>
+          <a:xfrm>
+            <a:off x="1567380" y="5686633"/>
+            <a:ext cx="5566736" cy="369332"/>
+          </a:xfrm>
+          <a:prstGeom prst="rect">
+            <a:avLst/>
+          </a:prstGeom>
+          <a:noFill/>
+        </p:spPr>
+        <p:txBody>
+          <a:bodyPr wrap="none" rtlCol="0">
+            <a:spAutoFit/>
           </a:bodyPr>
           <a:lstStyle/>
           <a:p>
             <a:r>
-              <a:rPr lang="en-US" dirty="0" err="1" smtClean="0"/>
-              <a:t>query_affected_datasets</a:t>
-            </a:r>
-            <a:r>
-              <a:rPr lang="en-US" dirty="0" smtClean="0"/>
-              <a:t/>
-            </a:r>
-            <a:br>
-              <a:rPr lang="en-US" dirty="0" smtClean="0"/>
-            </a:br>
-            <a:r>
-              <a:rPr lang="en-US" dirty="0" smtClean="0"/>
-              <a:t>Initialization</a:t>
+              <a:rPr lang="en-US" dirty="0" smtClean="0"/>
+              <a:t>Context history defines which official queries are possible</a:t>
             </a:r>
             <a:endParaRPr lang="en-US" dirty="0"/>
-          </a:p>
-        </p:txBody>
-      </p:sp>
-      <p:sp>
-        <p:nvSpPr>
-          <p:cNvPr id="3" name="Content Placeholder 2"/>
-          <p:cNvSpPr>
-            <a:spLocks noGrp="1"/>
-          </p:cNvSpPr>
-          <p:nvPr>
-            <p:ph idx="1"/>
-          </p:nvPr>
-        </p:nvSpPr>
-        <p:spPr/>
-        <p:txBody>
-          <a:bodyPr>
-            <a:normAutofit fontScale="85000" lnSpcReduction="20000"/>
-          </a:bodyPr>
-          <a:lstStyle/>
-          <a:p>
-            <a:r>
-              <a:rPr lang="en-US" sz="2800" dirty="0" err="1" smtClean="0"/>
-              <a:t>setenv</a:t>
-            </a:r>
-            <a:r>
-              <a:rPr lang="en-US" sz="2800" dirty="0" smtClean="0"/>
-              <a:t> </a:t>
-            </a:r>
-            <a:r>
-              <a:rPr lang="en-US" sz="2400" dirty="0" smtClean="0"/>
-              <a:t>CRDS_SERVER_URL </a:t>
-            </a:r>
-            <a:r>
-              <a:rPr lang="en-US" sz="2400" dirty="0" smtClean="0">
-                <a:hlinkClick r:id="rId2"/>
-              </a:rPr>
-              <a:t>https</a:t>
-            </a:r>
-            <a:r>
-              <a:rPr lang="en-US" sz="2800" dirty="0" smtClean="0">
-                <a:hlinkClick r:id="rId2"/>
-              </a:rPr>
-              <a:t>://jwst-crds-b6it.stsci.edu</a:t>
-            </a:r>
-            <a:endParaRPr lang="en-US" sz="2800" dirty="0" smtClean="0"/>
-          </a:p>
-          <a:p>
-            <a:r>
-              <a:rPr lang="en-US" sz="2800" dirty="0" err="1" smtClean="0"/>
-              <a:t>setenv</a:t>
-            </a:r>
-            <a:r>
-              <a:rPr lang="en-US" sz="2800" dirty="0" smtClean="0"/>
-              <a:t> CRDS_PATH  $HOME/</a:t>
-            </a:r>
-            <a:r>
-              <a:rPr lang="en-US" sz="2800" dirty="0" err="1" smtClean="0"/>
-              <a:t>crds_cache_affected</a:t>
-            </a:r>
-            <a:endParaRPr lang="en-US" sz="2800" dirty="0" smtClean="0"/>
-          </a:p>
-          <a:p>
-            <a:r>
-              <a:rPr lang="en-US" sz="2800" dirty="0" smtClean="0"/>
-              <a:t>Fake </a:t>
-            </a:r>
-            <a:r>
-              <a:rPr lang="en-US" sz="2800" dirty="0" err="1" smtClean="0"/>
-              <a:t>Init</a:t>
-            </a:r>
-            <a:endParaRPr lang="en-US" sz="2800" dirty="0" smtClean="0"/>
-          </a:p>
-          <a:p>
-            <a:pPr lvl="1"/>
-            <a:r>
-              <a:rPr lang="en-US" sz="2400" dirty="0" err="1" smtClean="0"/>
-              <a:t>query_affected_datasets</a:t>
-            </a:r>
-            <a:r>
-              <a:rPr lang="en-US" sz="2400" dirty="0" smtClean="0"/>
-              <a:t> –list</a:t>
-            </a:r>
-          </a:p>
-          <a:p>
-            <a:pPr lvl="2"/>
-            <a:r>
-              <a:rPr lang="en-US" sz="2000" dirty="0" smtClean="0"/>
-              <a:t>List out context history with QAD indices</a:t>
-            </a:r>
-          </a:p>
-          <a:p>
-            <a:pPr lvl="2"/>
-            <a:r>
-              <a:rPr lang="en-US" sz="2000" dirty="0" smtClean="0"/>
-              <a:t>B6 only has two stored transitions,  last two</a:t>
-            </a:r>
-          </a:p>
-          <a:p>
-            <a:pPr lvl="1"/>
-            <a:r>
-              <a:rPr lang="en-US" sz="2400" dirty="0" err="1" smtClean="0"/>
-              <a:t>query_affected_datasets</a:t>
-            </a:r>
-            <a:r>
-              <a:rPr lang="en-US" sz="2400" dirty="0" smtClean="0"/>
-              <a:t> –x 40 –y 41</a:t>
-            </a:r>
-          </a:p>
-          <a:p>
-            <a:pPr lvl="2"/>
-            <a:r>
-              <a:rPr lang="en-US" sz="2000" dirty="0" smtClean="0"/>
-              <a:t>Initialize query state as first of two B6 transitions</a:t>
-            </a:r>
-          </a:p>
-          <a:p>
-            <a:pPr lvl="2"/>
-            <a:r>
-              <a:rPr lang="en-US" sz="2000" dirty="0" smtClean="0"/>
-              <a:t>41 (jwst_0183.pmap) is assumed to be current default</a:t>
-            </a:r>
-          </a:p>
-          <a:p>
-            <a:r>
-              <a:rPr lang="en-US" dirty="0" smtClean="0"/>
-              <a:t>Real </a:t>
-            </a:r>
-            <a:r>
-              <a:rPr lang="en-US" dirty="0" err="1" smtClean="0"/>
-              <a:t>Init</a:t>
-            </a:r>
-            <a:endParaRPr lang="en-US" dirty="0" smtClean="0"/>
-          </a:p>
-          <a:p>
-            <a:pPr lvl="1"/>
-            <a:r>
-              <a:rPr lang="en-US" dirty="0" err="1" smtClean="0"/>
-              <a:t>query_affected_datasets</a:t>
-            </a:r>
-            <a:r>
-              <a:rPr lang="en-US" dirty="0" smtClean="0"/>
-              <a:t> –reset</a:t>
-            </a:r>
-          </a:p>
-          <a:p>
-            <a:pPr lvl="1"/>
-            <a:r>
-              <a:rPr lang="en-US" dirty="0" smtClean="0"/>
-              <a:t>Sets “last seen” to end of history</a:t>
-            </a:r>
-          </a:p>
-          <a:p>
-            <a:pPr lvl="1"/>
-            <a:r>
-              <a:rPr lang="en-US" dirty="0" smtClean="0"/>
-              <a:t>Since already at end, requires a new context to demo!</a:t>
-            </a:r>
           </a:p>
         </p:txBody>
       </p:sp>
     </p:spTree>
     <p:extLst>
       <p:ext uri="{BB962C8B-B14F-4D97-AF65-F5344CB8AC3E}">
-        <p14:creationId xmlns:p14="http://schemas.microsoft.com/office/powerpoint/2010/main" val="1964756010"/>
+        <p14:creationId xmlns:p14="http://schemas.microsoft.com/office/powerpoint/2010/main" val="1318187454"/>
       </p:ext>
     </p:extLst>
   </p:cSld>
@@ -4078,7 +3810,12 @@
             <p:ph type="title"/>
           </p:nvPr>
         </p:nvSpPr>
-        <p:spPr/>
+        <p:spPr>
+          <a:xfrm>
+            <a:off x="548726" y="2563022"/>
+            <a:ext cx="8229600" cy="1143000"/>
+          </a:xfrm>
+        </p:spPr>
         <p:txBody>
           <a:bodyPr>
             <a:normAutofit fontScale="90000"/>
@@ -4086,193 +3823,31 @@
           <a:lstStyle/>
           <a:p>
             <a:r>
-              <a:rPr lang="en-US" dirty="0" err="1" smtClean="0"/>
-              <a:t>query_affected_datasets</a:t>
-            </a:r>
-            <a:r>
-              <a:rPr lang="en-US" dirty="0" smtClean="0"/>
-              <a:t/>
+              <a:rPr lang="en-US" dirty="0" smtClean="0"/>
+              <a:t>Pipeline </a:t>
             </a:r>
             <a:br>
               <a:rPr lang="en-US" dirty="0" smtClean="0"/>
             </a:br>
             <a:r>
               <a:rPr lang="en-US" dirty="0" smtClean="0"/>
-              <a:t>single context update</a:t>
+              <a:t>Affected Datasets </a:t>
+            </a:r>
+            <a:br>
+              <a:rPr lang="en-US" dirty="0" smtClean="0"/>
+            </a:br>
+            <a:r>
+              <a:rPr lang="en-US" dirty="0" smtClean="0"/>
+              <a:t>Queries</a:t>
             </a:r>
             <a:endParaRPr lang="en-US" dirty="0"/>
-          </a:p>
-        </p:txBody>
-      </p:sp>
-      <p:sp>
-        <p:nvSpPr>
-          <p:cNvPr id="3" name="Content Placeholder 2"/>
-          <p:cNvSpPr>
-            <a:spLocks noGrp="1"/>
-          </p:cNvSpPr>
-          <p:nvPr>
-            <p:ph idx="1"/>
-          </p:nvPr>
-        </p:nvSpPr>
-        <p:spPr/>
-        <p:txBody>
-          <a:bodyPr>
-            <a:normAutofit fontScale="40000" lnSpcReduction="20000"/>
-          </a:bodyPr>
-          <a:lstStyle/>
-          <a:p>
-            <a:pPr marL="0" indent="0">
-              <a:buNone/>
-            </a:pPr>
-            <a:endParaRPr lang="en-US" dirty="0" smtClean="0"/>
-          </a:p>
-          <a:p>
-            <a:pPr marL="57150" indent="0">
-              <a:buNone/>
-            </a:pPr>
-            <a:r>
-              <a:rPr lang="en-US" sz="3800" dirty="0" smtClean="0"/>
-              <a:t>% </a:t>
-            </a:r>
-            <a:r>
-              <a:rPr lang="en-US" sz="3800" dirty="0" err="1"/>
-              <a:t>query_affected_datasets</a:t>
-            </a:r>
-            <a:r>
-              <a:rPr lang="en-US" sz="3800" dirty="0"/>
-              <a:t> </a:t>
-            </a:r>
-            <a:r>
-              <a:rPr lang="en-US" sz="3800" dirty="0" smtClean="0"/>
-              <a:t>–quiet</a:t>
-            </a:r>
-          </a:p>
-          <a:p>
-            <a:pPr marL="57150" indent="0">
-              <a:buNone/>
-            </a:pPr>
-            <a:endParaRPr lang="en-US" sz="3800" dirty="0"/>
-          </a:p>
-          <a:p>
-            <a:pPr marL="57150" indent="0">
-              <a:buNone/>
-            </a:pPr>
-            <a:r>
-              <a:rPr lang="en-US" sz="3800" dirty="0"/>
-              <a:t>CRDS  : INFO     Fetching effects for (41, '2016-05-18 09:40:19', 'jwst_0191.pmap', 'Delivered MIRI CDP5 files and corrections to several MIRI RMAPs to correct issues with selection of the reference files. Also, updated </a:t>
-            </a:r>
-            <a:r>
-              <a:rPr lang="en-US" sz="3800" dirty="0" err="1"/>
-              <a:t>NIRSpec</a:t>
-            </a:r>
-            <a:r>
-              <a:rPr lang="en-US" sz="3800" dirty="0"/>
-              <a:t> IMAP.')</a:t>
-            </a:r>
-          </a:p>
-          <a:p>
-            <a:pPr marL="57150" indent="0">
-              <a:buNone/>
-            </a:pPr>
-            <a:r>
-              <a:rPr lang="en-US" sz="3800" dirty="0"/>
-              <a:t>CRDS  : ERROR    CRDS server-side errors for 41 2016-05-21-11:40:11_0183_0191</a:t>
-            </a:r>
-          </a:p>
-          <a:p>
-            <a:pPr marL="57150" indent="0">
-              <a:buNone/>
-            </a:pPr>
-            <a:endParaRPr lang="en-US" sz="3800" dirty="0"/>
-          </a:p>
-          <a:p>
-            <a:pPr marL="57150" indent="0">
-              <a:buNone/>
-            </a:pPr>
-            <a:r>
-              <a:rPr lang="pl-PL" sz="3800" dirty="0"/>
-              <a:t>jw80600009001_02101_00001.mirimage</a:t>
-            </a:r>
-          </a:p>
-          <a:p>
-            <a:pPr marL="57150" indent="0">
-              <a:buNone/>
-            </a:pPr>
-            <a:r>
-              <a:rPr lang="pl-PL" sz="3800" dirty="0"/>
-              <a:t>jw80600016001_02101_00001.mirifulong</a:t>
-            </a:r>
-          </a:p>
-          <a:p>
-            <a:pPr marL="57150" indent="0">
-              <a:buNone/>
-            </a:pPr>
-            <a:r>
-              <a:rPr lang="pl-PL" sz="3800" dirty="0"/>
-              <a:t>jw80600018001_02101_00001.mirifulong</a:t>
-            </a:r>
-          </a:p>
-          <a:p>
-            <a:pPr marL="57150" indent="0">
-              <a:buNone/>
-            </a:pPr>
-            <a:r>
-              <a:rPr lang="pl-PL" sz="3800" dirty="0"/>
-              <a:t>jw80600018001_02101_00002.mirifulong</a:t>
-            </a:r>
-          </a:p>
-          <a:p>
-            <a:pPr marL="57150" indent="0">
-              <a:buNone/>
-            </a:pPr>
-            <a:r>
-              <a:rPr lang="pl-PL" sz="3800" dirty="0"/>
-              <a:t>jw80600018001_02101_00003.mirifulong</a:t>
-            </a:r>
-          </a:p>
-          <a:p>
-            <a:pPr marL="57150" indent="0">
-              <a:buNone/>
-            </a:pPr>
-            <a:r>
-              <a:rPr lang="pl-PL" sz="3800" dirty="0"/>
-              <a:t>jw80600020001_02101_00001.mirifulong</a:t>
-            </a:r>
-          </a:p>
-          <a:p>
-            <a:pPr marL="57150" indent="0">
-              <a:buNone/>
-            </a:pPr>
-            <a:r>
-              <a:rPr lang="pl-PL" sz="3800" dirty="0"/>
-              <a:t>jw80600039001_02102_00001.mirifulong</a:t>
-            </a:r>
-          </a:p>
-          <a:p>
-            <a:pPr marL="57150" indent="0">
-              <a:buNone/>
-            </a:pPr>
-            <a:r>
-              <a:rPr lang="pl-PL" sz="3800" dirty="0"/>
-              <a:t>jw80600039001_02102_00002.mirifulong</a:t>
-            </a:r>
-          </a:p>
-          <a:p>
-            <a:pPr marL="57150" indent="0">
-              <a:buNone/>
-            </a:pPr>
-            <a:r>
-              <a:rPr lang="pl-PL" sz="3800" dirty="0"/>
-              <a:t>jw80600050001_02102_00001.mirifulong</a:t>
-            </a:r>
-            <a:endParaRPr lang="en-US" sz="3800" dirty="0"/>
           </a:p>
         </p:txBody>
       </p:sp>
     </p:spTree>
     <p:extLst>
       <p:ext uri="{BB962C8B-B14F-4D97-AF65-F5344CB8AC3E}">
-        <p14:creationId xmlns:p14="http://schemas.microsoft.com/office/powerpoint/2010/main" val="4194281321"/>
+        <p14:creationId xmlns:p14="http://schemas.microsoft.com/office/powerpoint/2010/main" val="1136427432"/>
       </p:ext>
     </p:extLst>
   </p:cSld>
@@ -4299,40 +3874,622 @@
           <a:chExt cx="0" cy="0"/>
         </a:xfrm>
       </p:grpSpPr>
-      <p:pic>
-        <p:nvPicPr>
-          <p:cNvPr id="4" name="Picture 3" descr="bestrefs_io.png"/>
-          <p:cNvPicPr>
-            <a:picLocks noChangeAspect="1"/>
-          </p:cNvPicPr>
-          <p:nvPr/>
-        </p:nvPicPr>
-        <p:blipFill>
-          <a:blip r:embed="rId2">
-            <a:extLst>
-              <a:ext uri="{28A0092B-C50C-407E-A947-70E740481C1C}">
-                <a14:useLocalDpi xmlns:a14="http://schemas.microsoft.com/office/drawing/2010/main" val="0"/>
-              </a:ext>
-            </a:extLst>
-          </a:blip>
-          <a:stretch>
-            <a:fillRect/>
-          </a:stretch>
-        </p:blipFill>
+      <p:sp>
+        <p:nvSpPr>
+          <p:cNvPr id="2" name="Title 1"/>
+          <p:cNvSpPr>
+            <a:spLocks noGrp="1"/>
+          </p:cNvSpPr>
+          <p:nvPr>
+            <p:ph type="title"/>
+          </p:nvPr>
+        </p:nvSpPr>
         <p:spPr>
           <a:xfrm>
-            <a:off x="177800" y="736600"/>
-            <a:ext cx="8775700" cy="5372100"/>
+            <a:off x="457200" y="274638"/>
+            <a:ext cx="8229600" cy="743693"/>
           </a:xfrm>
-          <a:prstGeom prst="rect">
-            <a:avLst/>
-          </a:prstGeom>
         </p:spPr>
-      </p:pic>
+        <p:txBody>
+          <a:bodyPr>
+            <a:normAutofit fontScale="90000"/>
+          </a:bodyPr>
+          <a:lstStyle/>
+          <a:p>
+            <a:r>
+              <a:rPr lang="en-US" dirty="0" err="1" smtClean="0"/>
+              <a:t>query_affected_datasets</a:t>
+            </a:r>
+            <a:endParaRPr lang="en-US" dirty="0"/>
+          </a:p>
+        </p:txBody>
+      </p:sp>
+      <p:sp>
+        <p:nvSpPr>
+          <p:cNvPr id="3" name="Content Placeholder 2"/>
+          <p:cNvSpPr>
+            <a:spLocks noGrp="1"/>
+          </p:cNvSpPr>
+          <p:nvPr>
+            <p:ph idx="1"/>
+          </p:nvPr>
+        </p:nvSpPr>
+        <p:spPr>
+          <a:xfrm>
+            <a:off x="457200" y="1461228"/>
+            <a:ext cx="8229600" cy="4525963"/>
+          </a:xfrm>
+        </p:spPr>
+        <p:txBody>
+          <a:bodyPr>
+            <a:normAutofit fontScale="85000" lnSpcReduction="20000"/>
+          </a:bodyPr>
+          <a:lstStyle/>
+          <a:p>
+            <a:r>
+              <a:rPr lang="en-US" dirty="0" smtClean="0"/>
+              <a:t>CRDS Client Script / </a:t>
+            </a:r>
+            <a:r>
+              <a:rPr lang="en-US" dirty="0" err="1" smtClean="0"/>
+              <a:t>Poller</a:t>
+            </a:r>
+            <a:endParaRPr lang="en-US" dirty="0" smtClean="0"/>
+          </a:p>
+          <a:p>
+            <a:r>
+              <a:rPr lang="en-US" dirty="0" smtClean="0"/>
+              <a:t>Run in/near pipeline’s reprocessing environment</a:t>
+            </a:r>
+          </a:p>
+          <a:p>
+            <a:r>
+              <a:rPr lang="en-US" dirty="0" smtClean="0"/>
+              <a:t>Queries CRDS Server for Stored Results</a:t>
+            </a:r>
+          </a:p>
+          <a:p>
+            <a:pPr lvl="1"/>
+            <a:r>
+              <a:rPr lang="en-US" dirty="0" smtClean="0"/>
+              <a:t>Requires connection to CRDS server</a:t>
+            </a:r>
+          </a:p>
+          <a:p>
+            <a:pPr lvl="1"/>
+            <a:r>
+              <a:rPr lang="en-US" dirty="0" smtClean="0"/>
+              <a:t>Outputs list of affected IDs to </a:t>
+            </a:r>
+            <a:r>
+              <a:rPr lang="en-US" dirty="0" err="1" smtClean="0"/>
+              <a:t>stdout</a:t>
+            </a:r>
+            <a:endParaRPr lang="en-US" dirty="0" smtClean="0"/>
+          </a:p>
+          <a:p>
+            <a:pPr lvl="1"/>
+            <a:r>
+              <a:rPr lang="en-US" dirty="0" smtClean="0"/>
+              <a:t>Outputs log to </a:t>
+            </a:r>
+            <a:r>
+              <a:rPr lang="en-US" dirty="0" err="1" smtClean="0"/>
+              <a:t>stderr</a:t>
+            </a:r>
+            <a:endParaRPr lang="en-US" dirty="0" smtClean="0"/>
+          </a:p>
+          <a:p>
+            <a:pPr lvl="1"/>
+            <a:r>
+              <a:rPr lang="en-US" dirty="0" err="1" smtClean="0"/>
+              <a:t>Stateful</a:t>
+            </a:r>
+            <a:r>
+              <a:rPr lang="en-US" dirty="0" smtClean="0"/>
+              <a:t>:  </a:t>
+            </a:r>
+          </a:p>
+          <a:p>
+            <a:pPr lvl="2"/>
+            <a:r>
+              <a:rPr lang="en-US" dirty="0" smtClean="0"/>
+              <a:t>Remembers last context processed/queried</a:t>
+            </a:r>
+          </a:p>
+          <a:p>
+            <a:pPr lvl="2"/>
+            <a:r>
+              <a:rPr lang="en-US" dirty="0" smtClean="0"/>
+              <a:t>stores state in CRDS cache </a:t>
+            </a:r>
+            <a:r>
+              <a:rPr lang="en-US" dirty="0" err="1" smtClean="0"/>
+              <a:t>config</a:t>
+            </a:r>
+            <a:r>
+              <a:rPr lang="en-US" dirty="0" smtClean="0"/>
+              <a:t> area or file</a:t>
+            </a:r>
+          </a:p>
+          <a:p>
+            <a:r>
+              <a:rPr lang="en-US" dirty="0" smtClean="0"/>
+              <a:t>Queries limited to context transitions in history </a:t>
+            </a:r>
+          </a:p>
+          <a:p>
+            <a:r>
+              <a:rPr lang="en-US" dirty="0" smtClean="0"/>
+              <a:t>Requires one time initialization</a:t>
+            </a:r>
+          </a:p>
+          <a:p>
+            <a:pPr marL="0" indent="0">
+              <a:buNone/>
+            </a:pPr>
+            <a:endParaRPr lang="en-US" dirty="0"/>
+          </a:p>
+        </p:txBody>
+      </p:sp>
     </p:spTree>
     <p:extLst>
       <p:ext uri="{BB962C8B-B14F-4D97-AF65-F5344CB8AC3E}">
-        <p14:creationId xmlns:p14="http://schemas.microsoft.com/office/powerpoint/2010/main" val="374147554"/>
+        <p14:creationId xmlns:p14="http://schemas.microsoft.com/office/powerpoint/2010/main" val="2283690490"/>
+      </p:ext>
+    </p:extLst>
+  </p:cSld>
+  <p:clrMapOvr>
+    <a:masterClrMapping/>
+  </p:clrMapOvr>
+</p:sld>
+</file>
+
+<file path=ppt/slides/slide18.xml><?xml version="1.0" encoding="utf-8"?>
+<p:sld xmlns:a="http://schemas.openxmlformats.org/drawingml/2006/main" xmlns:r="http://schemas.openxmlformats.org/officeDocument/2006/relationships" xmlns:p="http://schemas.openxmlformats.org/presentationml/2006/main">
+  <p:cSld>
+    <p:spTree>
+      <p:nvGrpSpPr>
+        <p:cNvPr id="1" name=""/>
+        <p:cNvGrpSpPr/>
+        <p:nvPr/>
+      </p:nvGrpSpPr>
+      <p:grpSpPr>
+        <a:xfrm>
+          <a:off x="0" y="0"/>
+          <a:ext cx="0" cy="0"/>
+          <a:chOff x="0" y="0"/>
+          <a:chExt cx="0" cy="0"/>
+        </a:xfrm>
+      </p:grpSpPr>
+      <p:sp>
+        <p:nvSpPr>
+          <p:cNvPr id="2" name="Title 1"/>
+          <p:cNvSpPr>
+            <a:spLocks noGrp="1"/>
+          </p:cNvSpPr>
+          <p:nvPr>
+            <p:ph type="title"/>
+          </p:nvPr>
+        </p:nvSpPr>
+        <p:spPr/>
+        <p:txBody>
+          <a:bodyPr>
+            <a:normAutofit fontScale="90000"/>
+          </a:bodyPr>
+          <a:lstStyle/>
+          <a:p>
+            <a:r>
+              <a:rPr lang="en-US" dirty="0" err="1" smtClean="0"/>
+              <a:t>query_affected_datasets</a:t>
+            </a:r>
+            <a:r>
+              <a:rPr lang="en-US" dirty="0" smtClean="0"/>
+              <a:t/>
+            </a:r>
+            <a:br>
+              <a:rPr lang="en-US" dirty="0" smtClean="0"/>
+            </a:br>
+            <a:r>
+              <a:rPr lang="en-US" dirty="0" smtClean="0"/>
+              <a:t>Initialization</a:t>
+            </a:r>
+            <a:endParaRPr lang="en-US" dirty="0"/>
+          </a:p>
+        </p:txBody>
+      </p:sp>
+      <p:sp>
+        <p:nvSpPr>
+          <p:cNvPr id="3" name="Content Placeholder 2"/>
+          <p:cNvSpPr>
+            <a:spLocks noGrp="1"/>
+          </p:cNvSpPr>
+          <p:nvPr>
+            <p:ph idx="1"/>
+          </p:nvPr>
+        </p:nvSpPr>
+        <p:spPr/>
+        <p:txBody>
+          <a:bodyPr>
+            <a:normAutofit fontScale="85000" lnSpcReduction="20000"/>
+          </a:bodyPr>
+          <a:lstStyle/>
+          <a:p>
+            <a:r>
+              <a:rPr lang="en-US" sz="2800" dirty="0" err="1" smtClean="0"/>
+              <a:t>setenv</a:t>
+            </a:r>
+            <a:r>
+              <a:rPr lang="en-US" sz="2800" dirty="0" smtClean="0"/>
+              <a:t> </a:t>
+            </a:r>
+            <a:r>
+              <a:rPr lang="en-US" sz="2400" dirty="0" smtClean="0"/>
+              <a:t>CRDS_SERVER_URL </a:t>
+            </a:r>
+            <a:r>
+              <a:rPr lang="en-US" sz="2400" dirty="0" smtClean="0">
+                <a:hlinkClick r:id="rId2"/>
+              </a:rPr>
+              <a:t>https</a:t>
+            </a:r>
+            <a:r>
+              <a:rPr lang="en-US" sz="2800" dirty="0" smtClean="0">
+                <a:hlinkClick r:id="rId2"/>
+              </a:rPr>
+              <a:t>://jwst-crds-b6it.stsci.edu</a:t>
+            </a:r>
+            <a:endParaRPr lang="en-US" sz="2800" dirty="0" smtClean="0"/>
+          </a:p>
+          <a:p>
+            <a:r>
+              <a:rPr lang="en-US" sz="2800" dirty="0" err="1" smtClean="0"/>
+              <a:t>setenv</a:t>
+            </a:r>
+            <a:r>
+              <a:rPr lang="en-US" sz="2800" dirty="0" smtClean="0"/>
+              <a:t> CRDS_PATH  $HOME/</a:t>
+            </a:r>
+            <a:r>
+              <a:rPr lang="en-US" sz="2800" dirty="0" err="1" smtClean="0"/>
+              <a:t>crds_cache_affected</a:t>
+            </a:r>
+            <a:endParaRPr lang="en-US" sz="2800" dirty="0" smtClean="0"/>
+          </a:p>
+          <a:p>
+            <a:r>
+              <a:rPr lang="en-US" sz="2800" dirty="0" smtClean="0"/>
+              <a:t>Fake </a:t>
+            </a:r>
+            <a:r>
+              <a:rPr lang="en-US" sz="2800" dirty="0" err="1" smtClean="0"/>
+              <a:t>Init</a:t>
+            </a:r>
+            <a:endParaRPr lang="en-US" sz="2800" dirty="0" smtClean="0"/>
+          </a:p>
+          <a:p>
+            <a:pPr lvl="1"/>
+            <a:r>
+              <a:rPr lang="en-US" sz="2400" dirty="0" err="1" smtClean="0"/>
+              <a:t>query_affected_datasets</a:t>
+            </a:r>
+            <a:r>
+              <a:rPr lang="en-US" sz="2400" dirty="0" smtClean="0"/>
+              <a:t> –list</a:t>
+            </a:r>
+          </a:p>
+          <a:p>
+            <a:pPr lvl="2"/>
+            <a:r>
+              <a:rPr lang="en-US" sz="2000" dirty="0" smtClean="0"/>
+              <a:t>List out context history with QAD indices</a:t>
+            </a:r>
+          </a:p>
+          <a:p>
+            <a:pPr lvl="2"/>
+            <a:r>
+              <a:rPr lang="en-US" sz="2000" dirty="0" smtClean="0"/>
+              <a:t>B6 only has two stored transitions,  last two</a:t>
+            </a:r>
+          </a:p>
+          <a:p>
+            <a:pPr lvl="1"/>
+            <a:r>
+              <a:rPr lang="en-US" sz="2400" dirty="0" err="1" smtClean="0"/>
+              <a:t>query_affected_datasets</a:t>
+            </a:r>
+            <a:r>
+              <a:rPr lang="en-US" sz="2400" dirty="0" smtClean="0"/>
+              <a:t> –x 40 –y 41</a:t>
+            </a:r>
+          </a:p>
+          <a:p>
+            <a:pPr lvl="2"/>
+            <a:r>
+              <a:rPr lang="en-US" sz="2000" dirty="0" smtClean="0"/>
+              <a:t>Initialize query state as first of two B6 transitions</a:t>
+            </a:r>
+          </a:p>
+          <a:p>
+            <a:pPr lvl="2"/>
+            <a:r>
+              <a:rPr lang="en-US" sz="2000" dirty="0" smtClean="0"/>
+              <a:t>41 (jwst_0183.pmap) is assumed to be current default</a:t>
+            </a:r>
+          </a:p>
+          <a:p>
+            <a:r>
+              <a:rPr lang="en-US" dirty="0" smtClean="0"/>
+              <a:t>Real </a:t>
+            </a:r>
+            <a:r>
+              <a:rPr lang="en-US" dirty="0" err="1" smtClean="0"/>
+              <a:t>Init</a:t>
+            </a:r>
+            <a:endParaRPr lang="en-US" dirty="0" smtClean="0"/>
+          </a:p>
+          <a:p>
+            <a:pPr lvl="1"/>
+            <a:r>
+              <a:rPr lang="en-US" dirty="0" err="1" smtClean="0"/>
+              <a:t>query_affected_datasets</a:t>
+            </a:r>
+            <a:r>
+              <a:rPr lang="en-US" dirty="0" smtClean="0"/>
+              <a:t> –reset</a:t>
+            </a:r>
+          </a:p>
+          <a:p>
+            <a:pPr lvl="1"/>
+            <a:r>
+              <a:rPr lang="en-US" dirty="0" smtClean="0"/>
+              <a:t>Sets “last seen” to end of history</a:t>
+            </a:r>
+          </a:p>
+          <a:p>
+            <a:pPr lvl="1"/>
+            <a:r>
+              <a:rPr lang="en-US" dirty="0" smtClean="0"/>
+              <a:t>Since already at end, requires a new context to demo!</a:t>
+            </a:r>
+          </a:p>
+        </p:txBody>
+      </p:sp>
+    </p:spTree>
+    <p:extLst>
+      <p:ext uri="{BB962C8B-B14F-4D97-AF65-F5344CB8AC3E}">
+        <p14:creationId xmlns:p14="http://schemas.microsoft.com/office/powerpoint/2010/main" val="1964756010"/>
+      </p:ext>
+    </p:extLst>
+  </p:cSld>
+  <p:clrMapOvr>
+    <a:masterClrMapping/>
+  </p:clrMapOvr>
+</p:sld>
+</file>
+
+<file path=ppt/slides/slide19.xml><?xml version="1.0" encoding="utf-8"?>
+<p:sld xmlns:a="http://schemas.openxmlformats.org/drawingml/2006/main" xmlns:r="http://schemas.openxmlformats.org/officeDocument/2006/relationships" xmlns:p="http://schemas.openxmlformats.org/presentationml/2006/main">
+  <p:cSld>
+    <p:spTree>
+      <p:nvGrpSpPr>
+        <p:cNvPr id="1" name=""/>
+        <p:cNvGrpSpPr/>
+        <p:nvPr/>
+      </p:nvGrpSpPr>
+      <p:grpSpPr>
+        <a:xfrm>
+          <a:off x="0" y="0"/>
+          <a:ext cx="0" cy="0"/>
+          <a:chOff x="0" y="0"/>
+          <a:chExt cx="0" cy="0"/>
+        </a:xfrm>
+      </p:grpSpPr>
+      <p:sp>
+        <p:nvSpPr>
+          <p:cNvPr id="2" name="Title 1"/>
+          <p:cNvSpPr>
+            <a:spLocks noGrp="1"/>
+          </p:cNvSpPr>
+          <p:nvPr>
+            <p:ph type="title"/>
+          </p:nvPr>
+        </p:nvSpPr>
+        <p:spPr/>
+        <p:txBody>
+          <a:bodyPr>
+            <a:normAutofit fontScale="90000"/>
+          </a:bodyPr>
+          <a:lstStyle/>
+          <a:p>
+            <a:r>
+              <a:rPr lang="en-US" dirty="0" err="1" smtClean="0"/>
+              <a:t>query_affected_datasets</a:t>
+            </a:r>
+            <a:r>
+              <a:rPr lang="en-US" dirty="0" smtClean="0"/>
+              <a:t/>
+            </a:r>
+            <a:br>
+              <a:rPr lang="en-US" dirty="0" smtClean="0"/>
+            </a:br>
+            <a:r>
+              <a:rPr lang="en-US" dirty="0" smtClean="0"/>
+              <a:t>single context update</a:t>
+            </a:r>
+            <a:endParaRPr lang="en-US" dirty="0"/>
+          </a:p>
+        </p:txBody>
+      </p:sp>
+      <p:sp>
+        <p:nvSpPr>
+          <p:cNvPr id="3" name="Content Placeholder 2"/>
+          <p:cNvSpPr>
+            <a:spLocks noGrp="1"/>
+          </p:cNvSpPr>
+          <p:nvPr>
+            <p:ph idx="1"/>
+          </p:nvPr>
+        </p:nvSpPr>
+        <p:spPr/>
+        <p:txBody>
+          <a:bodyPr>
+            <a:normAutofit fontScale="40000" lnSpcReduction="20000"/>
+          </a:bodyPr>
+          <a:lstStyle/>
+          <a:p>
+            <a:pPr marL="0" indent="0">
+              <a:buNone/>
+            </a:pPr>
+            <a:endParaRPr lang="en-US" dirty="0" smtClean="0"/>
+          </a:p>
+          <a:p>
+            <a:pPr marL="57150" indent="0">
+              <a:buNone/>
+            </a:pPr>
+            <a:r>
+              <a:rPr lang="en-US" sz="3800" dirty="0" smtClean="0"/>
+              <a:t>% </a:t>
+            </a:r>
+            <a:r>
+              <a:rPr lang="en-US" sz="3800" dirty="0" err="1"/>
+              <a:t>query_affected_datasets</a:t>
+            </a:r>
+            <a:r>
+              <a:rPr lang="en-US" sz="3800" dirty="0"/>
+              <a:t> </a:t>
+            </a:r>
+            <a:r>
+              <a:rPr lang="en-US" sz="3800" dirty="0" smtClean="0"/>
+              <a:t>–quiet</a:t>
+            </a:r>
+          </a:p>
+          <a:p>
+            <a:pPr marL="57150" indent="0">
+              <a:buNone/>
+            </a:pPr>
+            <a:endParaRPr lang="en-US" sz="3800" dirty="0"/>
+          </a:p>
+          <a:p>
+            <a:pPr marL="57150" indent="0">
+              <a:buNone/>
+            </a:pPr>
+            <a:r>
+              <a:rPr lang="en-US" sz="3800" dirty="0"/>
+              <a:t>CRDS  : INFO     Fetching effects for (41, '2016-05-18 09:40:19', 'jwst_0191.pmap', 'Delivered MIRI CDP5 files and corrections to several MIRI RMAPs to correct issues with selection of the reference files. Also, updated </a:t>
+            </a:r>
+            <a:r>
+              <a:rPr lang="en-US" sz="3800" dirty="0" err="1"/>
+              <a:t>NIRSpec</a:t>
+            </a:r>
+            <a:r>
+              <a:rPr lang="en-US" sz="3800" dirty="0"/>
+              <a:t> IMAP.')</a:t>
+            </a:r>
+          </a:p>
+          <a:p>
+            <a:pPr marL="57150" indent="0">
+              <a:buNone/>
+            </a:pPr>
+            <a:r>
+              <a:rPr lang="en-US" sz="3800" dirty="0"/>
+              <a:t>CRDS  : ERROR    CRDS server-side errors for 41 2016-05-21-11:40:11_0183_0191</a:t>
+            </a:r>
+          </a:p>
+          <a:p>
+            <a:pPr marL="57150" indent="0">
+              <a:buNone/>
+            </a:pPr>
+            <a:endParaRPr lang="en-US" sz="3800" dirty="0"/>
+          </a:p>
+          <a:p>
+            <a:pPr marL="57150" indent="0">
+              <a:buNone/>
+            </a:pPr>
+            <a:r>
+              <a:rPr lang="pl-PL" sz="3800" dirty="0"/>
+              <a:t>jw80600009001_02101_00001.mirimage</a:t>
+            </a:r>
+          </a:p>
+          <a:p>
+            <a:pPr marL="57150" indent="0">
+              <a:buNone/>
+            </a:pPr>
+            <a:r>
+              <a:rPr lang="pl-PL" sz="3800" dirty="0"/>
+              <a:t>jw80600016001_02101_00001.mirifulong</a:t>
+            </a:r>
+          </a:p>
+          <a:p>
+            <a:pPr marL="57150" indent="0">
+              <a:buNone/>
+            </a:pPr>
+            <a:r>
+              <a:rPr lang="pl-PL" sz="3800" dirty="0"/>
+              <a:t>jw80600018001_02101_00001.mirifulong</a:t>
+            </a:r>
+          </a:p>
+          <a:p>
+            <a:pPr marL="57150" indent="0">
+              <a:buNone/>
+            </a:pPr>
+            <a:r>
+              <a:rPr lang="pl-PL" sz="3800" dirty="0"/>
+              <a:t>jw80600018001_02101_00002.mirifulong</a:t>
+            </a:r>
+          </a:p>
+          <a:p>
+            <a:pPr marL="57150" indent="0">
+              <a:buNone/>
+            </a:pPr>
+            <a:r>
+              <a:rPr lang="pl-PL" sz="3800" dirty="0"/>
+              <a:t>jw80600018001_02101_00003.mirifulong</a:t>
+            </a:r>
+          </a:p>
+          <a:p>
+            <a:pPr marL="57150" indent="0">
+              <a:buNone/>
+            </a:pPr>
+            <a:r>
+              <a:rPr lang="pl-PL" sz="3800" dirty="0"/>
+              <a:t>jw80600020001_02101_00001.mirifulong</a:t>
+            </a:r>
+          </a:p>
+          <a:p>
+            <a:pPr marL="57150" indent="0">
+              <a:buNone/>
+            </a:pPr>
+            <a:r>
+              <a:rPr lang="pl-PL" sz="3800" dirty="0"/>
+              <a:t>jw80600039001_02102_00001.mirifulong</a:t>
+            </a:r>
+          </a:p>
+          <a:p>
+            <a:pPr marL="57150" indent="0">
+              <a:buNone/>
+            </a:pPr>
+            <a:r>
+              <a:rPr lang="pl-PL" sz="3800" dirty="0"/>
+              <a:t>jw80600039001_02102_00002.mirifulong</a:t>
+            </a:r>
+          </a:p>
+          <a:p>
+            <a:pPr marL="57150" indent="0">
+              <a:buNone/>
+            </a:pPr>
+            <a:r>
+              <a:rPr lang="pl-PL" sz="3800" dirty="0"/>
+              <a:t>jw80600050001_02102_00001.mirifulong</a:t>
+            </a:r>
+            <a:endParaRPr lang="en-US" sz="3800" dirty="0"/>
+          </a:p>
+        </p:txBody>
+      </p:sp>
+    </p:spTree>
+    <p:extLst>
+      <p:ext uri="{BB962C8B-B14F-4D97-AF65-F5344CB8AC3E}">
+        <p14:creationId xmlns:p14="http://schemas.microsoft.com/office/powerpoint/2010/main" val="4194281321"/>
       </p:ext>
     </p:extLst>
   </p:cSld>
@@ -4615,13 +4772,8 @@
             <a:pPr lvl="2"/>
             <a:r>
               <a:rPr lang="en-US" dirty="0" smtClean="0"/>
-              <a:t>cont</a:t>
-            </a:r>
-            <a:r>
-              <a:rPr lang="en-US" dirty="0" smtClean="0"/>
-              <a:t>ext-to-context comparison</a:t>
-            </a:r>
-            <a:endParaRPr lang="en-US" dirty="0" smtClean="0"/>
+              <a:t>context-to-context comparison</a:t>
+            </a:r>
           </a:p>
           <a:p>
             <a:pPr lvl="2"/>
@@ -4634,11 +4786,7 @@
             <a:pPr lvl="3"/>
             <a:r>
               <a:rPr lang="en-US" dirty="0" smtClean="0"/>
-              <a:t>T</a:t>
-            </a:r>
-            <a:r>
-              <a:rPr lang="en-US" dirty="0" smtClean="0"/>
-              <a:t>wo CRDS contexts from CRDS cache</a:t>
+              <a:t>Two CRDS contexts from CRDS cache</a:t>
             </a:r>
           </a:p>
           <a:p>

</xml_diff>

<commit_message>
Changes to affected datasets presentation.
</commit_message>
<xml_diff>
--- a/docs/Affected_Datasets_Demo.pptx
+++ b/docs/Affected_Datasets_Demo.pptx
@@ -306,7 +306,7 @@
           <a:p>
             <a:fld id="{7AAA13CD-EFCD-2245-A8BF-50917DA6C9A8}" type="datetimeFigureOut">
               <a:rPr lang="en-US" smtClean="0"/>
-              <a:t>May 23 2016</a:t>
+              <a:t>May 24 2016</a:t>
             </a:fld>
             <a:endParaRPr lang="en-US"/>
           </a:p>
@@ -476,7 +476,7 @@
           <a:p>
             <a:fld id="{7AAA13CD-EFCD-2245-A8BF-50917DA6C9A8}" type="datetimeFigureOut">
               <a:rPr lang="en-US" smtClean="0"/>
-              <a:t>May 23 2016</a:t>
+              <a:t>May 24 2016</a:t>
             </a:fld>
             <a:endParaRPr lang="en-US"/>
           </a:p>
@@ -656,7 +656,7 @@
           <a:p>
             <a:fld id="{7AAA13CD-EFCD-2245-A8BF-50917DA6C9A8}" type="datetimeFigureOut">
               <a:rPr lang="en-US" smtClean="0"/>
-              <a:t>May 23 2016</a:t>
+              <a:t>May 24 2016</a:t>
             </a:fld>
             <a:endParaRPr lang="en-US"/>
           </a:p>
@@ -826,7 +826,7 @@
           <a:p>
             <a:fld id="{7AAA13CD-EFCD-2245-A8BF-50917DA6C9A8}" type="datetimeFigureOut">
               <a:rPr lang="en-US" smtClean="0"/>
-              <a:t>May 23 2016</a:t>
+              <a:t>May 24 2016</a:t>
             </a:fld>
             <a:endParaRPr lang="en-US"/>
           </a:p>
@@ -1072,7 +1072,7 @@
           <a:p>
             <a:fld id="{7AAA13CD-EFCD-2245-A8BF-50917DA6C9A8}" type="datetimeFigureOut">
               <a:rPr lang="en-US" smtClean="0"/>
-              <a:t>May 23 2016</a:t>
+              <a:t>May 24 2016</a:t>
             </a:fld>
             <a:endParaRPr lang="en-US"/>
           </a:p>
@@ -1360,7 +1360,7 @@
           <a:p>
             <a:fld id="{7AAA13CD-EFCD-2245-A8BF-50917DA6C9A8}" type="datetimeFigureOut">
               <a:rPr lang="en-US" smtClean="0"/>
-              <a:t>May 23 2016</a:t>
+              <a:t>May 24 2016</a:t>
             </a:fld>
             <a:endParaRPr lang="en-US"/>
           </a:p>
@@ -1782,7 +1782,7 @@
           <a:p>
             <a:fld id="{7AAA13CD-EFCD-2245-A8BF-50917DA6C9A8}" type="datetimeFigureOut">
               <a:rPr lang="en-US" smtClean="0"/>
-              <a:t>May 23 2016</a:t>
+              <a:t>May 24 2016</a:t>
             </a:fld>
             <a:endParaRPr lang="en-US"/>
           </a:p>
@@ -1900,7 +1900,7 @@
           <a:p>
             <a:fld id="{7AAA13CD-EFCD-2245-A8BF-50917DA6C9A8}" type="datetimeFigureOut">
               <a:rPr lang="en-US" smtClean="0"/>
-              <a:t>May 23 2016</a:t>
+              <a:t>May 24 2016</a:t>
             </a:fld>
             <a:endParaRPr lang="en-US"/>
           </a:p>
@@ -1995,7 +1995,7 @@
           <a:p>
             <a:fld id="{7AAA13CD-EFCD-2245-A8BF-50917DA6C9A8}" type="datetimeFigureOut">
               <a:rPr lang="en-US" smtClean="0"/>
-              <a:t>May 23 2016</a:t>
+              <a:t>May 24 2016</a:t>
             </a:fld>
             <a:endParaRPr lang="en-US"/>
           </a:p>
@@ -2272,7 +2272,7 @@
           <a:p>
             <a:fld id="{7AAA13CD-EFCD-2245-A8BF-50917DA6C9A8}" type="datetimeFigureOut">
               <a:rPr lang="en-US" smtClean="0"/>
-              <a:t>May 23 2016</a:t>
+              <a:t>May 24 2016</a:t>
             </a:fld>
             <a:endParaRPr lang="en-US"/>
           </a:p>
@@ -2525,7 +2525,7 @@
           <a:p>
             <a:fld id="{7AAA13CD-EFCD-2245-A8BF-50917DA6C9A8}" type="datetimeFigureOut">
               <a:rPr lang="en-US" smtClean="0"/>
-              <a:t>May 23 2016</a:t>
+              <a:t>May 24 2016</a:t>
             </a:fld>
             <a:endParaRPr lang="en-US"/>
           </a:p>
@@ -2738,7 +2738,7 @@
           <a:p>
             <a:fld id="{7AAA13CD-EFCD-2245-A8BF-50917DA6C9A8}" type="datetimeFigureOut">
               <a:rPr lang="en-US" smtClean="0"/>
-              <a:t>May 23 2016</a:t>
+              <a:t>May 24 2016</a:t>
             </a:fld>
             <a:endParaRPr lang="en-US"/>
           </a:p>
@@ -3572,6 +3572,13 @@
   <p:clrMapOvr>
     <a:masterClrMapping/>
   </p:clrMapOvr>
+  <p:timing>
+    <p:tnLst>
+      <p:par>
+        <p:cTn xmlns:p14="http://schemas.microsoft.com/office/powerpoint/2010/main" id="1" dur="indefinite" restart="never" nodeType="tmRoot"/>
+      </p:par>
+    </p:tnLst>
+  </p:timing>
 </p:sld>
 </file>
 
@@ -3662,6 +3669,13 @@
   <p:clrMapOvr>
     <a:masterClrMapping/>
   </p:clrMapOvr>
+  <p:timing>
+    <p:tnLst>
+      <p:par>
+        <p:cTn xmlns:p14="http://schemas.microsoft.com/office/powerpoint/2010/main" id="1" dur="indefinite" restart="never" nodeType="tmRoot"/>
+      </p:par>
+    </p:tnLst>
+  </p:timing>
 </p:sld>
 </file>
 
@@ -3780,6 +3794,13 @@
   <p:clrMapOvr>
     <a:masterClrMapping/>
   </p:clrMapOvr>
+  <p:timing>
+    <p:tnLst>
+      <p:par>
+        <p:cTn xmlns:p14="http://schemas.microsoft.com/office/powerpoint/2010/main" id="1" dur="indefinite" restart="never" nodeType="tmRoot"/>
+      </p:par>
+    </p:tnLst>
+  </p:timing>
 </p:sld>
 </file>
 
@@ -3854,6 +3875,13 @@
   <p:clrMapOvr>
     <a:masterClrMapping/>
   </p:clrMapOvr>
+  <p:timing>
+    <p:tnLst>
+      <p:par>
+        <p:cTn xmlns:p14="http://schemas.microsoft.com/office/powerpoint/2010/main" id="1" dur="indefinite" restart="never" nodeType="tmRoot"/>
+      </p:par>
+    </p:tnLst>
+  </p:timing>
 </p:sld>
 </file>
 
@@ -4679,6 +4707,13 @@
   <p:clrMapOvr>
     <a:masterClrMapping/>
   </p:clrMapOvr>
+  <p:timing>
+    <p:tnLst>
+      <p:par>
+        <p:cTn xmlns:p14="http://schemas.microsoft.com/office/powerpoint/2010/main" id="1" dur="indefinite" restart="never" nodeType="tmRoot"/>
+      </p:par>
+    </p:tnLst>
+  </p:timing>
 </p:sld>
 </file>
 
@@ -5112,7 +5147,11 @@
             </a:r>
             <a:r>
               <a:rPr lang="en-US" sz="2400" dirty="0"/>
-              <a:t> --old-context jwst_0183.pmap --new-context jwst_0190.pmap --affected-datasets</a:t>
+              <a:t> --old-context jwst_0183.pmap --new-context jwst_0190.pmap --affected-</a:t>
+            </a:r>
+            <a:r>
+              <a:rPr lang="en-US" sz="2400" dirty="0" smtClean="0"/>
+              <a:t>datasets </a:t>
             </a:r>
             <a:endParaRPr lang="en-US" sz="2400" dirty="0" smtClean="0"/>
           </a:p>
@@ -5536,6 +5575,13 @@
   <p:clrMapOvr>
     <a:masterClrMapping/>
   </p:clrMapOvr>
+  <p:timing>
+    <p:tnLst>
+      <p:par>
+        <p:cTn xmlns:p14="http://schemas.microsoft.com/office/powerpoint/2010/main" id="1" dur="indefinite" restart="never" nodeType="tmRoot"/>
+      </p:par>
+    </p:tnLst>
+  </p:timing>
 </p:sld>
 </file>
 

</xml_diff>